<commit_message>
Upd: Rod results (seminar 12)
</commit_message>
<xml_diff>
--- a/Seminar 11 - Compact Rod/seminar_11_rod.pptx
+++ b/Seminar 11 - Compact Rod/seminar_11_rod.pptx
@@ -291,7 +291,7 @@
           <a:p>
             <a:fld id="{73261BF4-8B2C-784B-9959-B59A059012C3}" type="datetimeFigureOut">
               <a:rPr lang="en-RU" smtClean="0"/>
-              <a:t>03/09/2022</a:t>
+              <a:t>03/10/2022</a:t>
             </a:fld>
             <a:endParaRPr lang="en-RU"/>
           </a:p>
@@ -13620,7 +13620,7 @@
           <a:p>
             <a:fld id="{53063DFB-8595-A44B-9F09-A50FA310E559}" type="datetimeFigureOut">
               <a:rPr lang="en-RU" smtClean="0"/>
-              <a:t>03/09/2022</a:t>
+              <a:t>03/10/2022</a:t>
             </a:fld>
             <a:endParaRPr lang="en-RU"/>
           </a:p>
@@ -14248,1721 +14248,8 @@
           </a:p>
         </p:txBody>
       </p:sp>
-      <mc:AlternateContent xmlns:mc="http://schemas.openxmlformats.org/markup-compatibility/2006">
-        <mc:Choice xmlns:a14="http://schemas.microsoft.com/office/drawing/2010/main" Requires="a14">
-          <p:sp>
-            <p:nvSpPr>
-              <p:cNvPr id="4" name="Текст 3">
-                <a:extLst>
-                  <a:ext uri="{FF2B5EF4-FFF2-40B4-BE49-F238E27FC236}">
-                    <a16:creationId xmlns:a16="http://schemas.microsoft.com/office/drawing/2014/main" id="{53356540-7218-FF4B-B6BC-5BD291A372E2}"/>
-                  </a:ext>
-                </a:extLst>
-              </p:cNvPr>
-              <p:cNvSpPr>
-                <a:spLocks noGrp="1"/>
-              </p:cNvSpPr>
-              <p:nvPr>
-                <p:ph type="body" sz="quarter" idx="12"/>
-              </p:nvPr>
-            </p:nvSpPr>
-            <p:spPr/>
-            <p:txBody>
-              <a:bodyPr>
-                <a:normAutofit/>
-              </a:bodyPr>
-              <a:lstStyle/>
-              <a:p>
-                <a:r>
-                  <a:rPr lang="ru-RU" dirty="0"/>
-                  <a:t>Уравнение</a:t>
-                </a:r>
-              </a:p>
-              <a:p>
-                <a14:m>
-                  <m:oMathPara xmlns:m="http://schemas.openxmlformats.org/officeDocument/2006/math">
-                    <m:oMathParaPr>
-                      <m:jc m:val="centerGroup"/>
-                    </m:oMathParaPr>
-                    <m:oMath xmlns:m="http://schemas.openxmlformats.org/officeDocument/2006/math">
-                      <m:r>
-                        <a:rPr lang="en-US" b="0" i="1" smtClean="0">
-                          <a:latin typeface="Cambria Math" panose="02040503050406030204" pitchFamily="18" charset="0"/>
-                        </a:rPr>
-                        <m:t>𝜌</m:t>
-                      </m:r>
-                      <m:sSubSup>
-                        <m:sSubSupPr>
-                          <m:ctrlPr>
-                            <a:rPr lang="en-US" b="0" i="1" smtClean="0">
-                              <a:latin typeface="Cambria Math" panose="02040503050406030204" pitchFamily="18" charset="0"/>
-                            </a:rPr>
-                          </m:ctrlPr>
-                        </m:sSubSupPr>
-                        <m:e>
-                          <m:r>
-                            <a:rPr lang="en-US" b="0" i="1" smtClean="0">
-                              <a:latin typeface="Cambria Math" panose="02040503050406030204" pitchFamily="18" charset="0"/>
-                            </a:rPr>
-                            <m:t>𝜕</m:t>
-                          </m:r>
-                        </m:e>
-                        <m:sub>
-                          <m:r>
-                            <a:rPr lang="en-US" b="0" i="1" smtClean="0">
-                              <a:latin typeface="Cambria Math" panose="02040503050406030204" pitchFamily="18" charset="0"/>
-                            </a:rPr>
-                            <m:t>𝑡</m:t>
-                          </m:r>
-                        </m:sub>
-                        <m:sup>
-                          <m:r>
-                            <a:rPr lang="en-US" b="0" i="1" smtClean="0">
-                              <a:latin typeface="Cambria Math" panose="02040503050406030204" pitchFamily="18" charset="0"/>
-                            </a:rPr>
-                            <m:t>2</m:t>
-                          </m:r>
-                        </m:sup>
-                      </m:sSubSup>
-                      <m:r>
-                        <a:rPr lang="en-US" b="0" i="1" smtClean="0">
-                          <a:latin typeface="Cambria Math" panose="02040503050406030204" pitchFamily="18" charset="0"/>
-                        </a:rPr>
-                        <m:t>𝑢</m:t>
-                      </m:r>
-                      <m:r>
-                        <a:rPr lang="en-US" b="0" i="1" smtClean="0">
-                          <a:latin typeface="Cambria Math" panose="02040503050406030204" pitchFamily="18" charset="0"/>
-                        </a:rPr>
-                        <m:t>−</m:t>
-                      </m:r>
-                      <m:sSup>
-                        <m:sSupPr>
-                          <m:ctrlPr>
-                            <a:rPr lang="en-US" b="0" i="1" smtClean="0">
-                              <a:latin typeface="Cambria Math" panose="02040503050406030204" pitchFamily="18" charset="0"/>
-                            </a:rPr>
-                          </m:ctrlPr>
-                        </m:sSupPr>
-                        <m:e>
-                          <m:r>
-                            <a:rPr lang="en-US" b="0" i="1" smtClean="0">
-                              <a:latin typeface="Cambria Math" panose="02040503050406030204" pitchFamily="18" charset="0"/>
-                            </a:rPr>
-                            <m:t>𝑅</m:t>
-                          </m:r>
-                        </m:e>
-                        <m:sup>
-                          <m:r>
-                            <a:rPr lang="en-US" b="0" i="1" smtClean="0">
-                              <a:latin typeface="Cambria Math" panose="02040503050406030204" pitchFamily="18" charset="0"/>
-                            </a:rPr>
-                            <m:t>2</m:t>
-                          </m:r>
-                        </m:sup>
-                      </m:sSup>
-                      <m:r>
-                        <a:rPr lang="en-US" b="0" i="1" smtClean="0">
-                          <a:latin typeface="Cambria Math" panose="02040503050406030204" pitchFamily="18" charset="0"/>
-                        </a:rPr>
-                        <m:t>𝜌</m:t>
-                      </m:r>
-                      <m:sSubSup>
-                        <m:sSubSupPr>
-                          <m:ctrlPr>
-                            <a:rPr lang="en-US" b="0" i="1" smtClean="0">
-                              <a:latin typeface="Cambria Math" panose="02040503050406030204" pitchFamily="18" charset="0"/>
-                            </a:rPr>
-                          </m:ctrlPr>
-                        </m:sSubSupPr>
-                        <m:e>
-                          <m:r>
-                            <a:rPr lang="en-US" i="1">
-                              <a:latin typeface="Cambria Math" panose="02040503050406030204" pitchFamily="18" charset="0"/>
-                            </a:rPr>
-                            <m:t>𝜕</m:t>
-                          </m:r>
-                        </m:e>
-                        <m:sub>
-                          <m:sSup>
-                            <m:sSupPr>
-                              <m:ctrlPr>
-                                <a:rPr lang="en-US" b="0" i="1" smtClean="0">
-                                  <a:latin typeface="Cambria Math" panose="02040503050406030204" pitchFamily="18" charset="0"/>
-                                </a:rPr>
-                              </m:ctrlPr>
-                            </m:sSupPr>
-                            <m:e>
-                              <m:r>
-                                <a:rPr lang="en-US" b="0" i="1" smtClean="0">
-                                  <a:latin typeface="Cambria Math" panose="02040503050406030204" pitchFamily="18" charset="0"/>
-                                </a:rPr>
-                                <m:t>𝑥</m:t>
-                              </m:r>
-                            </m:e>
-                            <m:sup>
-                              <m:r>
-                                <a:rPr lang="en-US" b="0" i="1" smtClean="0">
-                                  <a:latin typeface="Cambria Math" panose="02040503050406030204" pitchFamily="18" charset="0"/>
-                                </a:rPr>
-                                <m:t>2</m:t>
-                              </m:r>
-                            </m:sup>
-                          </m:sSup>
-                          <m:sSup>
-                            <m:sSupPr>
-                              <m:ctrlPr>
-                                <a:rPr lang="en-US" b="0" i="1" smtClean="0">
-                                  <a:latin typeface="Cambria Math" panose="02040503050406030204" pitchFamily="18" charset="0"/>
-                                </a:rPr>
-                              </m:ctrlPr>
-                            </m:sSupPr>
-                            <m:e>
-                              <m:r>
-                                <a:rPr lang="en-US" b="0" i="1" smtClean="0">
-                                  <a:latin typeface="Cambria Math" panose="02040503050406030204" pitchFamily="18" charset="0"/>
-                                </a:rPr>
-                                <m:t>𝑡</m:t>
-                              </m:r>
-                            </m:e>
-                            <m:sup>
-                              <m:r>
-                                <a:rPr lang="en-US" b="0" i="1" smtClean="0">
-                                  <a:latin typeface="Cambria Math" panose="02040503050406030204" pitchFamily="18" charset="0"/>
-                                </a:rPr>
-                                <m:t>2</m:t>
-                              </m:r>
-                            </m:sup>
-                          </m:sSup>
-                        </m:sub>
-                        <m:sup>
-                          <m:r>
-                            <a:rPr lang="en-US" i="1">
-                              <a:latin typeface="Cambria Math" panose="02040503050406030204" pitchFamily="18" charset="0"/>
-                            </a:rPr>
-                            <m:t>4</m:t>
-                          </m:r>
-                        </m:sup>
-                      </m:sSubSup>
-                      <m:r>
-                        <a:rPr lang="en-US" b="0" i="1" smtClean="0">
-                          <a:latin typeface="Cambria Math" panose="02040503050406030204" pitchFamily="18" charset="0"/>
-                        </a:rPr>
-                        <m:t>𝑢</m:t>
-                      </m:r>
-                      <m:r>
-                        <a:rPr lang="en-US" b="0" i="1" smtClean="0">
-                          <a:latin typeface="Cambria Math" panose="02040503050406030204" pitchFamily="18" charset="0"/>
-                        </a:rPr>
-                        <m:t>+</m:t>
-                      </m:r>
-                      <m:r>
-                        <a:rPr lang="en-US" b="0" i="1" smtClean="0">
-                          <a:latin typeface="Cambria Math" panose="02040503050406030204" pitchFamily="18" charset="0"/>
-                        </a:rPr>
-                        <m:t>𝐸</m:t>
-                      </m:r>
-                      <m:sSup>
-                        <m:sSupPr>
-                          <m:ctrlPr>
-                            <a:rPr lang="en-US" b="0" i="1" smtClean="0">
-                              <a:latin typeface="Cambria Math" panose="02040503050406030204" pitchFamily="18" charset="0"/>
-                            </a:rPr>
-                          </m:ctrlPr>
-                        </m:sSupPr>
-                        <m:e>
-                          <m:r>
-                            <a:rPr lang="en-US" b="0" i="1" smtClean="0">
-                              <a:latin typeface="Cambria Math" panose="02040503050406030204" pitchFamily="18" charset="0"/>
-                            </a:rPr>
-                            <m:t>𝑅</m:t>
-                          </m:r>
-                        </m:e>
-                        <m:sup>
-                          <m:r>
-                            <a:rPr lang="en-US" b="0" i="1" smtClean="0">
-                              <a:latin typeface="Cambria Math" panose="02040503050406030204" pitchFamily="18" charset="0"/>
-                            </a:rPr>
-                            <m:t>2</m:t>
-                          </m:r>
-                        </m:sup>
-                      </m:sSup>
-                      <m:sSubSup>
-                        <m:sSubSupPr>
-                          <m:ctrlPr>
-                            <a:rPr lang="en-US" b="0" i="1" smtClean="0">
-                              <a:latin typeface="Cambria Math" panose="02040503050406030204" pitchFamily="18" charset="0"/>
-                            </a:rPr>
-                          </m:ctrlPr>
-                        </m:sSubSupPr>
-                        <m:e>
-                          <m:r>
-                            <a:rPr lang="en-US" b="0" i="1" smtClean="0">
-                              <a:latin typeface="Cambria Math" panose="02040503050406030204" pitchFamily="18" charset="0"/>
-                            </a:rPr>
-                            <m:t>𝜕</m:t>
-                          </m:r>
-                        </m:e>
-                        <m:sub>
-                          <m:r>
-                            <a:rPr lang="en-US" b="0" i="1" smtClean="0">
-                              <a:latin typeface="Cambria Math" panose="02040503050406030204" pitchFamily="18" charset="0"/>
-                            </a:rPr>
-                            <m:t>𝑥</m:t>
-                          </m:r>
-                        </m:sub>
-                        <m:sup>
-                          <m:r>
-                            <a:rPr lang="en-US" b="0" i="1" smtClean="0">
-                              <a:latin typeface="Cambria Math" panose="02040503050406030204" pitchFamily="18" charset="0"/>
-                            </a:rPr>
-                            <m:t>4</m:t>
-                          </m:r>
-                        </m:sup>
-                      </m:sSubSup>
-                      <m:r>
-                        <a:rPr lang="en-US" b="0" i="1" smtClean="0">
-                          <a:latin typeface="Cambria Math" panose="02040503050406030204" pitchFamily="18" charset="0"/>
-                        </a:rPr>
-                        <m:t>𝑢</m:t>
-                      </m:r>
-                      <m:r>
-                        <a:rPr lang="en-US" b="0" i="1" smtClean="0">
-                          <a:latin typeface="Cambria Math" panose="02040503050406030204" pitchFamily="18" charset="0"/>
-                        </a:rPr>
-                        <m:t>=</m:t>
-                      </m:r>
-                      <m:acc>
-                        <m:accPr>
-                          <m:chr m:val="̂"/>
-                          <m:ctrlPr>
-                            <a:rPr lang="en-US" b="0" i="1" smtClean="0">
-                              <a:latin typeface="Cambria Math" panose="02040503050406030204" pitchFamily="18" charset="0"/>
-                            </a:rPr>
-                          </m:ctrlPr>
-                        </m:accPr>
-                        <m:e>
-                          <m:r>
-                            <a:rPr lang="en-US" b="0" i="1" smtClean="0">
-                              <a:latin typeface="Cambria Math" panose="02040503050406030204" pitchFamily="18" charset="0"/>
-                            </a:rPr>
-                            <m:t>𝑓</m:t>
-                          </m:r>
-                        </m:e>
-                      </m:acc>
-                      <m:r>
-                        <a:rPr lang="en-US" b="0" i="1" smtClean="0">
-                          <a:latin typeface="Cambria Math" panose="02040503050406030204" pitchFamily="18" charset="0"/>
-                        </a:rPr>
-                        <m:t>(</m:t>
-                      </m:r>
-                      <m:r>
-                        <a:rPr lang="en-US" b="0" i="1" smtClean="0">
-                          <a:latin typeface="Cambria Math" panose="02040503050406030204" pitchFamily="18" charset="0"/>
-                        </a:rPr>
-                        <m:t>𝑡</m:t>
-                      </m:r>
-                      <m:r>
-                        <a:rPr lang="en-US" b="0" i="1" smtClean="0">
-                          <a:latin typeface="Cambria Math" panose="02040503050406030204" pitchFamily="18" charset="0"/>
-                        </a:rPr>
-                        <m:t>,</m:t>
-                      </m:r>
-                      <m:r>
-                        <a:rPr lang="en-US" b="0" i="1" smtClean="0">
-                          <a:latin typeface="Cambria Math" panose="02040503050406030204" pitchFamily="18" charset="0"/>
-                        </a:rPr>
-                        <m:t>𝑥</m:t>
-                      </m:r>
-                      <m:r>
-                        <a:rPr lang="en-US" b="0" i="1" smtClean="0">
-                          <a:latin typeface="Cambria Math" panose="02040503050406030204" pitchFamily="18" charset="0"/>
-                        </a:rPr>
-                        <m:t>)</m:t>
-                      </m:r>
-                    </m:oMath>
-                  </m:oMathPara>
-                </a14:m>
-                <a:endParaRPr lang="ru-RU" dirty="0"/>
-              </a:p>
-              <a:p>
-                <a:r>
-                  <a:rPr lang="ru-RU" dirty="0"/>
-                  <a:t>описывает динамику распространения поперечных колебаний стержня.</a:t>
-                </a:r>
-                <a:r>
-                  <a:rPr lang="en-US" dirty="0"/>
-                  <a:t> </a:t>
-                </a:r>
-                <a:r>
-                  <a:rPr lang="ru-RU" dirty="0"/>
-                  <a:t>Другой вид:</a:t>
-                </a:r>
-              </a:p>
-              <a:p>
-                <a14:m>
-                  <m:oMathPara xmlns:m="http://schemas.openxmlformats.org/officeDocument/2006/math">
-                    <m:oMathParaPr>
-                      <m:jc m:val="centerGroup"/>
-                    </m:oMathParaPr>
-                    <m:oMath xmlns:m="http://schemas.openxmlformats.org/officeDocument/2006/math">
-                      <m:sSubSup>
-                        <m:sSubSupPr>
-                          <m:ctrlPr>
-                            <a:rPr lang="en-US" b="0" i="1" smtClean="0">
-                              <a:latin typeface="Cambria Math" panose="02040503050406030204" pitchFamily="18" charset="0"/>
-                            </a:rPr>
-                          </m:ctrlPr>
-                        </m:sSubSupPr>
-                        <m:e>
-                          <m:r>
-                            <a:rPr lang="en-US" b="0" i="1" smtClean="0">
-                              <a:latin typeface="Cambria Math" panose="02040503050406030204" pitchFamily="18" charset="0"/>
-                            </a:rPr>
-                            <m:t>𝜕</m:t>
-                          </m:r>
-                        </m:e>
-                        <m:sub>
-                          <m:r>
-                            <a:rPr lang="en-US" b="0" i="1" smtClean="0">
-                              <a:latin typeface="Cambria Math" panose="02040503050406030204" pitchFamily="18" charset="0"/>
-                            </a:rPr>
-                            <m:t>𝑡</m:t>
-                          </m:r>
-                        </m:sub>
-                        <m:sup>
-                          <m:r>
-                            <a:rPr lang="en-US" b="0" i="1" smtClean="0">
-                              <a:latin typeface="Cambria Math" panose="02040503050406030204" pitchFamily="18" charset="0"/>
-                            </a:rPr>
-                            <m:t>2</m:t>
-                          </m:r>
-                        </m:sup>
-                      </m:sSubSup>
-                      <m:r>
-                        <a:rPr lang="en-US" b="0" i="1" smtClean="0">
-                          <a:latin typeface="Cambria Math" panose="02040503050406030204" pitchFamily="18" charset="0"/>
-                        </a:rPr>
-                        <m:t>𝑢</m:t>
-                      </m:r>
-                      <m:r>
-                        <a:rPr lang="en-US" b="0" i="1" smtClean="0">
-                          <a:latin typeface="Cambria Math" panose="02040503050406030204" pitchFamily="18" charset="0"/>
-                        </a:rPr>
-                        <m:t>−</m:t>
-                      </m:r>
-                      <m:r>
-                        <a:rPr lang="en-US" b="0" i="1" smtClean="0">
-                          <a:latin typeface="Cambria Math" panose="02040503050406030204" pitchFamily="18" charset="0"/>
-                        </a:rPr>
-                        <m:t>𝐷</m:t>
-                      </m:r>
-                      <m:sSubSup>
-                        <m:sSubSupPr>
-                          <m:ctrlPr>
-                            <a:rPr lang="en-US" b="0" i="1" smtClean="0">
-                              <a:latin typeface="Cambria Math" panose="02040503050406030204" pitchFamily="18" charset="0"/>
-                            </a:rPr>
-                          </m:ctrlPr>
-                        </m:sSubSupPr>
-                        <m:e>
-                          <m:r>
-                            <a:rPr lang="en-US" i="1">
-                              <a:latin typeface="Cambria Math" panose="02040503050406030204" pitchFamily="18" charset="0"/>
-                            </a:rPr>
-                            <m:t>𝜕</m:t>
-                          </m:r>
-                        </m:e>
-                        <m:sub>
-                          <m:sSup>
-                            <m:sSupPr>
-                              <m:ctrlPr>
-                                <a:rPr lang="en-US" b="0" i="1" smtClean="0">
-                                  <a:latin typeface="Cambria Math" panose="02040503050406030204" pitchFamily="18" charset="0"/>
-                                </a:rPr>
-                              </m:ctrlPr>
-                            </m:sSupPr>
-                            <m:e>
-                              <m:r>
-                                <a:rPr lang="en-US" b="0" i="1" smtClean="0">
-                                  <a:latin typeface="Cambria Math" panose="02040503050406030204" pitchFamily="18" charset="0"/>
-                                </a:rPr>
-                                <m:t>𝑥</m:t>
-                              </m:r>
-                            </m:e>
-                            <m:sup>
-                              <m:r>
-                                <a:rPr lang="en-US" b="0" i="1" smtClean="0">
-                                  <a:latin typeface="Cambria Math" panose="02040503050406030204" pitchFamily="18" charset="0"/>
-                                </a:rPr>
-                                <m:t>2</m:t>
-                              </m:r>
-                            </m:sup>
-                          </m:sSup>
-                          <m:sSup>
-                            <m:sSupPr>
-                              <m:ctrlPr>
-                                <a:rPr lang="en-US" b="0" i="1" smtClean="0">
-                                  <a:latin typeface="Cambria Math" panose="02040503050406030204" pitchFamily="18" charset="0"/>
-                                </a:rPr>
-                              </m:ctrlPr>
-                            </m:sSupPr>
-                            <m:e>
-                              <m:r>
-                                <a:rPr lang="en-US" b="0" i="1" smtClean="0">
-                                  <a:latin typeface="Cambria Math" panose="02040503050406030204" pitchFamily="18" charset="0"/>
-                                </a:rPr>
-                                <m:t>𝑡</m:t>
-                              </m:r>
-                            </m:e>
-                            <m:sup>
-                              <m:r>
-                                <a:rPr lang="en-US" b="0" i="1" smtClean="0">
-                                  <a:latin typeface="Cambria Math" panose="02040503050406030204" pitchFamily="18" charset="0"/>
-                                </a:rPr>
-                                <m:t>2</m:t>
-                              </m:r>
-                            </m:sup>
-                          </m:sSup>
-                        </m:sub>
-                        <m:sup>
-                          <m:r>
-                            <a:rPr lang="en-US" i="1">
-                              <a:latin typeface="Cambria Math" panose="02040503050406030204" pitchFamily="18" charset="0"/>
-                            </a:rPr>
-                            <m:t>4</m:t>
-                          </m:r>
-                        </m:sup>
-                      </m:sSubSup>
-                      <m:r>
-                        <a:rPr lang="en-US" b="0" i="1" smtClean="0">
-                          <a:latin typeface="Cambria Math" panose="02040503050406030204" pitchFamily="18" charset="0"/>
-                        </a:rPr>
-                        <m:t>𝑢</m:t>
-                      </m:r>
-                      <m:r>
-                        <a:rPr lang="en-US" b="0" i="1" smtClean="0">
-                          <a:latin typeface="Cambria Math" panose="02040503050406030204" pitchFamily="18" charset="0"/>
-                        </a:rPr>
-                        <m:t>+</m:t>
-                      </m:r>
-                      <m:r>
-                        <a:rPr lang="en-US" b="0" i="1" smtClean="0">
-                          <a:latin typeface="Cambria Math" panose="02040503050406030204" pitchFamily="18" charset="0"/>
-                        </a:rPr>
-                        <m:t>𝐶</m:t>
-                      </m:r>
-                      <m:sSubSup>
-                        <m:sSubSupPr>
-                          <m:ctrlPr>
-                            <a:rPr lang="en-US" b="0" i="1" smtClean="0">
-                              <a:latin typeface="Cambria Math" panose="02040503050406030204" pitchFamily="18" charset="0"/>
-                            </a:rPr>
-                          </m:ctrlPr>
-                        </m:sSubSupPr>
-                        <m:e>
-                          <m:r>
-                            <a:rPr lang="en-US" b="0" i="1" smtClean="0">
-                              <a:latin typeface="Cambria Math" panose="02040503050406030204" pitchFamily="18" charset="0"/>
-                            </a:rPr>
-                            <m:t>𝜕</m:t>
-                          </m:r>
-                        </m:e>
-                        <m:sub>
-                          <m:r>
-                            <a:rPr lang="en-US" b="0" i="1" smtClean="0">
-                              <a:latin typeface="Cambria Math" panose="02040503050406030204" pitchFamily="18" charset="0"/>
-                            </a:rPr>
-                            <m:t>𝑥</m:t>
-                          </m:r>
-                        </m:sub>
-                        <m:sup>
-                          <m:r>
-                            <a:rPr lang="en-US" b="0" i="1" smtClean="0">
-                              <a:latin typeface="Cambria Math" panose="02040503050406030204" pitchFamily="18" charset="0"/>
-                            </a:rPr>
-                            <m:t>4</m:t>
-                          </m:r>
-                        </m:sup>
-                      </m:sSubSup>
-                      <m:r>
-                        <a:rPr lang="en-US" b="0" i="1" smtClean="0">
-                          <a:latin typeface="Cambria Math" panose="02040503050406030204" pitchFamily="18" charset="0"/>
-                        </a:rPr>
-                        <m:t>𝑢</m:t>
-                      </m:r>
-                      <m:r>
-                        <a:rPr lang="en-US" b="0" i="1" smtClean="0">
-                          <a:latin typeface="Cambria Math" panose="02040503050406030204" pitchFamily="18" charset="0"/>
-                        </a:rPr>
-                        <m:t>=</m:t>
-                      </m:r>
-                      <m:r>
-                        <a:rPr lang="en-US" b="0" i="1" smtClean="0">
-                          <a:latin typeface="Cambria Math" panose="02040503050406030204" pitchFamily="18" charset="0"/>
-                        </a:rPr>
-                        <m:t>𝑓</m:t>
-                      </m:r>
-                      <m:d>
-                        <m:dPr>
-                          <m:ctrlPr>
-                            <a:rPr lang="en-US" b="0" i="1" smtClean="0">
-                              <a:latin typeface="Cambria Math" panose="02040503050406030204" pitchFamily="18" charset="0"/>
-                            </a:rPr>
-                          </m:ctrlPr>
-                        </m:dPr>
-                        <m:e>
-                          <m:r>
-                            <a:rPr lang="en-US" b="0" i="1" smtClean="0">
-                              <a:latin typeface="Cambria Math" panose="02040503050406030204" pitchFamily="18" charset="0"/>
-                            </a:rPr>
-                            <m:t>𝑡</m:t>
-                          </m:r>
-                          <m:r>
-                            <a:rPr lang="en-US" b="0" i="1" smtClean="0">
-                              <a:latin typeface="Cambria Math" panose="02040503050406030204" pitchFamily="18" charset="0"/>
-                            </a:rPr>
-                            <m:t>,</m:t>
-                          </m:r>
-                          <m:r>
-                            <a:rPr lang="en-US" b="0" i="1" smtClean="0">
-                              <a:latin typeface="Cambria Math" panose="02040503050406030204" pitchFamily="18" charset="0"/>
-                            </a:rPr>
-                            <m:t>𝑥</m:t>
-                          </m:r>
-                        </m:e>
-                      </m:d>
-                      <m:r>
-                        <a:rPr lang="en-US" b="0" i="1" smtClean="0">
-                          <a:latin typeface="Cambria Math" panose="02040503050406030204" pitchFamily="18" charset="0"/>
-                        </a:rPr>
-                        <m:t>,</m:t>
-                      </m:r>
-                    </m:oMath>
-                  </m:oMathPara>
-                </a14:m>
-                <a:endParaRPr lang="en-US" dirty="0"/>
-              </a:p>
-              <a:p>
-                <a:r>
-                  <a:rPr lang="ru-RU" dirty="0"/>
-                  <a:t>где </a:t>
-                </a:r>
-                <a14:m>
-                  <m:oMath xmlns:m="http://schemas.openxmlformats.org/officeDocument/2006/math">
-                    <m:r>
-                      <a:rPr lang="en-US" b="0" i="1" smtClean="0">
-                        <a:latin typeface="Cambria Math" panose="02040503050406030204" pitchFamily="18" charset="0"/>
-                      </a:rPr>
-                      <m:t>𝐷</m:t>
-                    </m:r>
-                    <m:r>
-                      <a:rPr lang="en-US" b="0" i="1" smtClean="0">
-                        <a:latin typeface="Cambria Math" panose="02040503050406030204" pitchFamily="18" charset="0"/>
-                      </a:rPr>
-                      <m:t>=</m:t>
-                    </m:r>
-                    <m:sSup>
-                      <m:sSupPr>
-                        <m:ctrlPr>
-                          <a:rPr lang="en-US" b="0" i="1" smtClean="0">
-                            <a:latin typeface="Cambria Math" panose="02040503050406030204" pitchFamily="18" charset="0"/>
-                          </a:rPr>
-                        </m:ctrlPr>
-                      </m:sSupPr>
-                      <m:e>
-                        <m:r>
-                          <a:rPr lang="en-US" b="0" i="1" smtClean="0">
-                            <a:latin typeface="Cambria Math" panose="02040503050406030204" pitchFamily="18" charset="0"/>
-                          </a:rPr>
-                          <m:t>𝑅</m:t>
-                        </m:r>
-                      </m:e>
-                      <m:sup>
-                        <m:r>
-                          <a:rPr lang="en-US" b="0" i="1" smtClean="0">
-                            <a:latin typeface="Cambria Math" panose="02040503050406030204" pitchFamily="18" charset="0"/>
-                          </a:rPr>
-                          <m:t>2</m:t>
-                        </m:r>
-                      </m:sup>
-                    </m:sSup>
-                  </m:oMath>
-                </a14:m>
-                <a:r>
-                  <a:rPr lang="ru-RU" dirty="0"/>
-                  <a:t> и </a:t>
-                </a:r>
-                <a14:m>
-                  <m:oMath xmlns:m="http://schemas.openxmlformats.org/officeDocument/2006/math">
-                    <m:r>
-                      <a:rPr lang="en-US" b="0" i="1" smtClean="0">
-                        <a:latin typeface="Cambria Math" panose="02040503050406030204" pitchFamily="18" charset="0"/>
-                      </a:rPr>
-                      <m:t>𝐶</m:t>
-                    </m:r>
-                    <m:r>
-                      <a:rPr lang="en-US" b="0" i="1" smtClean="0">
-                        <a:latin typeface="Cambria Math" panose="02040503050406030204" pitchFamily="18" charset="0"/>
-                      </a:rPr>
-                      <m:t>=</m:t>
-                    </m:r>
-                    <m:r>
-                      <a:rPr lang="en-US" b="0" i="1" smtClean="0">
-                        <a:latin typeface="Cambria Math" panose="02040503050406030204" pitchFamily="18" charset="0"/>
-                      </a:rPr>
-                      <m:t>𝐸</m:t>
-                    </m:r>
-                    <m:sSup>
-                      <m:sSupPr>
-                        <m:ctrlPr>
-                          <a:rPr lang="en-US" b="0" i="1" smtClean="0">
-                            <a:latin typeface="Cambria Math" panose="02040503050406030204" pitchFamily="18" charset="0"/>
-                          </a:rPr>
-                        </m:ctrlPr>
-                      </m:sSupPr>
-                      <m:e>
-                        <m:r>
-                          <a:rPr lang="en-US" b="0" i="1" smtClean="0">
-                            <a:latin typeface="Cambria Math" panose="02040503050406030204" pitchFamily="18" charset="0"/>
-                          </a:rPr>
-                          <m:t>𝑅</m:t>
-                        </m:r>
-                      </m:e>
-                      <m:sup>
-                        <m:r>
-                          <a:rPr lang="en-US" b="0" i="1" smtClean="0">
-                            <a:latin typeface="Cambria Math" panose="02040503050406030204" pitchFamily="18" charset="0"/>
-                          </a:rPr>
-                          <m:t>2</m:t>
-                        </m:r>
-                      </m:sup>
-                    </m:sSup>
-                    <m:r>
-                      <a:rPr lang="en-US" b="0" i="1" smtClean="0">
-                        <a:latin typeface="Cambria Math" panose="02040503050406030204" pitchFamily="18" charset="0"/>
-                      </a:rPr>
-                      <m:t>/</m:t>
-                    </m:r>
-                    <m:r>
-                      <a:rPr lang="en-US" b="0" i="1" smtClean="0">
-                        <a:latin typeface="Cambria Math" panose="02040503050406030204" pitchFamily="18" charset="0"/>
-                      </a:rPr>
-                      <m:t>𝜌</m:t>
-                    </m:r>
-                  </m:oMath>
-                </a14:m>
-                <a:r>
-                  <a:rPr lang="ru-RU" dirty="0"/>
-                  <a:t>.</a:t>
-                </a:r>
-                <a:r>
-                  <a:rPr lang="en-US" dirty="0"/>
-                  <a:t> </a:t>
-                </a:r>
-                <a:r>
-                  <a:rPr lang="ru-RU" dirty="0"/>
-                  <a:t>Безразмерные параметры:</a:t>
-                </a:r>
-              </a:p>
-              <a:p>
-                <a:pPr/>
-                <a14:m>
-                  <m:oMathPara xmlns:m="http://schemas.openxmlformats.org/officeDocument/2006/math">
-                    <m:oMathParaPr>
-                      <m:jc m:val="centerGroup"/>
-                    </m:oMathParaPr>
-                    <m:oMath xmlns:m="http://schemas.openxmlformats.org/officeDocument/2006/math">
-                      <m:r>
-                        <a:rPr lang="en-US" i="1">
-                          <a:latin typeface="Cambria Math" panose="02040503050406030204" pitchFamily="18" charset="0"/>
-                        </a:rPr>
-                        <m:t>𝜈</m:t>
-                      </m:r>
-                      <m:r>
-                        <a:rPr lang="en-US" i="1">
-                          <a:latin typeface="Cambria Math" panose="02040503050406030204" pitchFamily="18" charset="0"/>
-                        </a:rPr>
-                        <m:t>=</m:t>
-                      </m:r>
-                      <m:r>
-                        <a:rPr lang="en-US" i="1">
-                          <a:latin typeface="Cambria Math" panose="02040503050406030204" pitchFamily="18" charset="0"/>
-                        </a:rPr>
-                        <m:t>𝐶</m:t>
-                      </m:r>
-                      <m:sSup>
-                        <m:sSupPr>
-                          <m:ctrlPr>
-                            <a:rPr lang="en-US" i="1">
-                              <a:latin typeface="Cambria Math" panose="02040503050406030204" pitchFamily="18" charset="0"/>
-                            </a:rPr>
-                          </m:ctrlPr>
-                        </m:sSupPr>
-                        <m:e>
-                          <m:r>
-                            <a:rPr lang="en-US" i="1">
-                              <a:latin typeface="Cambria Math" panose="02040503050406030204" pitchFamily="18" charset="0"/>
-                            </a:rPr>
-                            <m:t>𝜏</m:t>
-                          </m:r>
-                        </m:e>
-                        <m:sup>
-                          <m:r>
-                            <a:rPr lang="en-US" i="1">
-                              <a:latin typeface="Cambria Math" panose="02040503050406030204" pitchFamily="18" charset="0"/>
-                            </a:rPr>
-                            <m:t>2</m:t>
-                          </m:r>
-                        </m:sup>
-                      </m:sSup>
-                      <m:r>
-                        <a:rPr lang="en-US" i="1">
-                          <a:latin typeface="Cambria Math" panose="02040503050406030204" pitchFamily="18" charset="0"/>
-                        </a:rPr>
-                        <m:t>/</m:t>
-                      </m:r>
-                      <m:sSup>
-                        <m:sSupPr>
-                          <m:ctrlPr>
-                            <a:rPr lang="en-US" i="1">
-                              <a:latin typeface="Cambria Math" panose="02040503050406030204" pitchFamily="18" charset="0"/>
-                            </a:rPr>
-                          </m:ctrlPr>
-                        </m:sSupPr>
-                        <m:e>
-                          <m:r>
-                            <a:rPr lang="en-US" i="1">
-                              <a:latin typeface="Cambria Math" panose="02040503050406030204" pitchFamily="18" charset="0"/>
-                            </a:rPr>
-                            <m:t>h</m:t>
-                          </m:r>
-                        </m:e>
-                        <m:sup>
-                          <m:r>
-                            <a:rPr lang="en-US" i="1">
-                              <a:latin typeface="Cambria Math" panose="02040503050406030204" pitchFamily="18" charset="0"/>
-                            </a:rPr>
-                            <m:t>4</m:t>
-                          </m:r>
-                        </m:sup>
-                      </m:sSup>
-                      <m:r>
-                        <a:rPr lang="en-US" i="1">
-                          <a:latin typeface="Cambria Math" panose="02040503050406030204" pitchFamily="18" charset="0"/>
-                        </a:rPr>
-                        <m:t>,  </m:t>
-                      </m:r>
-                      <m:r>
-                        <a:rPr lang="en-US" i="1">
-                          <a:latin typeface="Cambria Math" panose="02040503050406030204" pitchFamily="18" charset="0"/>
-                        </a:rPr>
-                        <m:t>𝜇</m:t>
-                      </m:r>
-                      <m:r>
-                        <a:rPr lang="en-US" i="1">
-                          <a:latin typeface="Cambria Math" panose="02040503050406030204" pitchFamily="18" charset="0"/>
-                        </a:rPr>
-                        <m:t>=</m:t>
-                      </m:r>
-                      <m:r>
-                        <a:rPr lang="en-US" i="1">
-                          <a:latin typeface="Cambria Math" panose="02040503050406030204" pitchFamily="18" charset="0"/>
-                        </a:rPr>
-                        <m:t>𝐷</m:t>
-                      </m:r>
-                      <m:r>
-                        <a:rPr lang="en-US" i="1">
-                          <a:latin typeface="Cambria Math" panose="02040503050406030204" pitchFamily="18" charset="0"/>
-                        </a:rPr>
-                        <m:t>/</m:t>
-                      </m:r>
-                      <m:sSup>
-                        <m:sSupPr>
-                          <m:ctrlPr>
-                            <a:rPr lang="en-US" i="1">
-                              <a:latin typeface="Cambria Math" panose="02040503050406030204" pitchFamily="18" charset="0"/>
-                            </a:rPr>
-                          </m:ctrlPr>
-                        </m:sSupPr>
-                        <m:e>
-                          <m:r>
-                            <a:rPr lang="en-US" i="1">
-                              <a:latin typeface="Cambria Math" panose="02040503050406030204" pitchFamily="18" charset="0"/>
-                            </a:rPr>
-                            <m:t>h</m:t>
-                          </m:r>
-                        </m:e>
-                        <m:sup>
-                          <m:r>
-                            <a:rPr lang="en-US" i="1">
-                              <a:latin typeface="Cambria Math" panose="02040503050406030204" pitchFamily="18" charset="0"/>
-                            </a:rPr>
-                            <m:t>2</m:t>
-                          </m:r>
-                        </m:sup>
-                      </m:sSup>
-                    </m:oMath>
-                  </m:oMathPara>
-                </a14:m>
-                <a:endParaRPr lang="ru-RU" dirty="0"/>
-              </a:p>
-              <a:p>
-                <a:endParaRPr lang="ru-RU" dirty="0"/>
-              </a:p>
-              <a:p>
-                <a:endParaRPr lang="ru-RU" dirty="0"/>
-              </a:p>
-            </p:txBody>
-          </p:sp>
-        </mc:Choice>
-        <mc:Fallback>
-          <p:sp>
-            <p:nvSpPr>
-              <p:cNvPr id="4" name="Текст 3">
-                <a:extLst>
-                  <a:ext uri="{FF2B5EF4-FFF2-40B4-BE49-F238E27FC236}">
-                    <a16:creationId xmlns:a16="http://schemas.microsoft.com/office/drawing/2014/main" id="{53356540-7218-FF4B-B6BC-5BD291A372E2}"/>
-                  </a:ext>
-                </a:extLst>
-              </p:cNvPr>
-              <p:cNvSpPr>
-                <a:spLocks noGrp="1" noRot="1" noChangeAspect="1" noMove="1" noResize="1" noEditPoints="1" noAdjustHandles="1" noChangeArrowheads="1" noChangeShapeType="1" noTextEdit="1"/>
-              </p:cNvSpPr>
-              <p:nvPr>
-                <p:ph type="body" sz="quarter" idx="12"/>
-              </p:nvPr>
-            </p:nvSpPr>
-            <p:spPr>
-              <a:blipFill>
-                <a:blip r:embed="rId2"/>
-                <a:stretch>
-                  <a:fillRect l="-1858" t="-1436"/>
-                </a:stretch>
-              </a:blipFill>
-            </p:spPr>
-            <p:txBody>
-              <a:bodyPr/>
-              <a:lstStyle/>
-              <a:p>
-                <a:r>
-                  <a:rPr lang="fr-CH">
-                    <a:noFill/>
-                  </a:rPr>
-                  <a:t> </a:t>
-                </a:r>
-              </a:p>
-            </p:txBody>
-          </p:sp>
-        </mc:Fallback>
-      </mc:AlternateContent>
-      <p:sp>
-        <p:nvSpPr>
-          <p:cNvPr id="5" name="Текст 4">
-            <a:extLst>
-              <a:ext uri="{FF2B5EF4-FFF2-40B4-BE49-F238E27FC236}">
-                <a16:creationId xmlns:a16="http://schemas.microsoft.com/office/drawing/2014/main" id="{3EB29DC1-D5D4-FB41-9E2D-AA4750D0CC8B}"/>
-              </a:ext>
-            </a:extLst>
-          </p:cNvPr>
-          <p:cNvSpPr>
-            <a:spLocks noGrp="1"/>
-          </p:cNvSpPr>
-          <p:nvPr>
-            <p:ph type="body" sz="quarter" idx="13"/>
-          </p:nvPr>
-        </p:nvSpPr>
-        <p:spPr/>
-        <p:txBody>
-          <a:bodyPr/>
-          <a:lstStyle/>
-          <a:p>
-            <a:r>
-              <a:rPr lang="ru-RU" dirty="0"/>
-              <a:t>Факультет экономических наук</a:t>
-            </a:r>
-          </a:p>
-          <a:p>
-            <a:r>
-              <a:rPr lang="ru-RU" dirty="0"/>
-              <a:t>Департамент математики</a:t>
-            </a:r>
-          </a:p>
-        </p:txBody>
-      </p:sp>
-      <p:sp>
-        <p:nvSpPr>
-          <p:cNvPr id="6" name="Текст 5">
-            <a:extLst>
-              <a:ext uri="{FF2B5EF4-FFF2-40B4-BE49-F238E27FC236}">
-                <a16:creationId xmlns:a16="http://schemas.microsoft.com/office/drawing/2014/main" id="{B5B6DD1A-BEFA-D842-9B7A-78D7BD1A5259}"/>
-              </a:ext>
-            </a:extLst>
-          </p:cNvPr>
-          <p:cNvSpPr>
-            <a:spLocks noGrp="1"/>
-          </p:cNvSpPr>
-          <p:nvPr>
-            <p:ph type="body" sz="quarter" idx="14"/>
-          </p:nvPr>
-        </p:nvSpPr>
-        <p:spPr/>
-        <p:txBody>
-          <a:bodyPr/>
-          <a:lstStyle/>
-          <a:p>
-            <a:r>
-              <a:rPr lang="ru-RU" dirty="0"/>
-              <a:t>Уравнение поперечных колебаний стержня</a:t>
-            </a:r>
-          </a:p>
-        </p:txBody>
-      </p:sp>
-      <p:sp>
-        <p:nvSpPr>
-          <p:cNvPr id="7" name="Текст 6">
-            <a:extLst>
-              <a:ext uri="{FF2B5EF4-FFF2-40B4-BE49-F238E27FC236}">
-                <a16:creationId xmlns:a16="http://schemas.microsoft.com/office/drawing/2014/main" id="{88968744-3B75-9B47-92FD-77E1E725F232}"/>
-              </a:ext>
-            </a:extLst>
-          </p:cNvPr>
-          <p:cNvSpPr>
-            <a:spLocks noGrp="1"/>
-          </p:cNvSpPr>
-          <p:nvPr>
-            <p:ph type="body" sz="quarter" idx="15"/>
-          </p:nvPr>
-        </p:nvSpPr>
-        <p:spPr/>
-        <p:txBody>
-          <a:bodyPr/>
-          <a:lstStyle/>
-          <a:p>
-            <a:r>
-              <a:rPr lang="ru-RU" dirty="0"/>
-              <a:t>Введение</a:t>
-            </a:r>
-          </a:p>
-        </p:txBody>
-      </p:sp>
-      <mc:AlternateContent xmlns:mc="http://schemas.openxmlformats.org/markup-compatibility/2006">
-        <mc:Choice xmlns:a14="http://schemas.microsoft.com/office/drawing/2010/main" Requires="a14">
-          <p:graphicFrame>
-            <p:nvGraphicFramePr>
-              <p:cNvPr id="8" name="Table 8">
-                <a:extLst>
-                  <a:ext uri="{FF2B5EF4-FFF2-40B4-BE49-F238E27FC236}">
-                    <a16:creationId xmlns:a16="http://schemas.microsoft.com/office/drawing/2014/main" id="{2C6F59B2-DCEE-4659-B6E3-12BAF222332E}"/>
-                  </a:ext>
-                </a:extLst>
-              </p:cNvPr>
-              <p:cNvGraphicFramePr>
-                <a:graphicFrameLocks noGrp="1"/>
-              </p:cNvGraphicFramePr>
-              <p:nvPr>
-                <p:extLst>
-                  <p:ext uri="{D42A27DB-BD31-4B8C-83A1-F6EECF244321}">
-                    <p14:modId xmlns:p14="http://schemas.microsoft.com/office/powerpoint/2010/main" val="1239617158"/>
-                  </p:ext>
-                </p:extLst>
-              </p:nvPr>
-            </p:nvGraphicFramePr>
-            <p:xfrm>
-              <a:off x="564196" y="4185993"/>
-              <a:ext cx="5492882" cy="1586904"/>
-            </p:xfrm>
-            <a:graphic>
-              <a:graphicData uri="http://schemas.openxmlformats.org/drawingml/2006/table">
-                <a:tbl>
-                  <a:tblPr firstRow="1" bandRow="1">
-                    <a:tableStyleId>{5C22544A-7EE6-4342-B048-85BDC9FD1C3A}</a:tableStyleId>
-                  </a:tblPr>
-                  <a:tblGrid>
-                    <a:gridCol w="1582143">
-                      <a:extLst>
-                        <a:ext uri="{9D8B030D-6E8A-4147-A177-3AD203B41FA5}">
-                          <a16:colId xmlns:a16="http://schemas.microsoft.com/office/drawing/2014/main" val="219512031"/>
-                        </a:ext>
-                      </a:extLst>
-                    </a:gridCol>
-                    <a:gridCol w="1511085">
-                      <a:extLst>
-                        <a:ext uri="{9D8B030D-6E8A-4147-A177-3AD203B41FA5}">
-                          <a16:colId xmlns:a16="http://schemas.microsoft.com/office/drawing/2014/main" val="2064641327"/>
-                        </a:ext>
-                      </a:extLst>
-                    </a:gridCol>
-                    <a:gridCol w="2399654">
-                      <a:extLst>
-                        <a:ext uri="{9D8B030D-6E8A-4147-A177-3AD203B41FA5}">
-                          <a16:colId xmlns:a16="http://schemas.microsoft.com/office/drawing/2014/main" val="3570533111"/>
-                        </a:ext>
-                      </a:extLst>
-                    </a:gridCol>
-                  </a:tblGrid>
-                  <a:tr h="279785">
-                    <a:tc>
-                      <a:txBody>
-                        <a:bodyPr/>
-                        <a:lstStyle/>
-                        <a:p>
-                          <a:r>
-                            <a:rPr lang="ru-RU" dirty="0"/>
-                            <a:t>Коэффициент</a:t>
-                          </a:r>
-                          <a:endParaRPr lang="fr-CH" dirty="0"/>
-                        </a:p>
-                      </a:txBody>
-                      <a:tcPr/>
-                    </a:tc>
-                    <a:tc>
-                      <a:txBody>
-                        <a:bodyPr/>
-                        <a:lstStyle/>
-                        <a:p>
-                          <a:r>
-                            <a:rPr lang="ru-RU" dirty="0"/>
-                            <a:t>Размерность</a:t>
-                          </a:r>
-                          <a:endParaRPr lang="fr-CH" dirty="0"/>
-                        </a:p>
-                      </a:txBody>
-                      <a:tcPr/>
-                    </a:tc>
-                    <a:tc>
-                      <a:txBody>
-                        <a:bodyPr/>
-                        <a:lstStyle/>
-                        <a:p>
-                          <a:r>
-                            <a:rPr lang="ru-RU" dirty="0"/>
-                            <a:t>Описание</a:t>
-                          </a:r>
-                          <a:endParaRPr lang="fr-CH" dirty="0"/>
-                        </a:p>
-                      </a:txBody>
-                      <a:tcPr/>
-                    </a:tc>
-                    <a:extLst>
-                      <a:ext uri="{0D108BD9-81ED-4DB2-BD59-A6C34878D82A}">
-                        <a16:rowId xmlns:a16="http://schemas.microsoft.com/office/drawing/2014/main" val="3609856121"/>
-                      </a:ext>
-                    </a:extLst>
-                  </a:tr>
-                  <a:tr h="279785">
-                    <a:tc>
-                      <a:txBody>
-                        <a:bodyPr/>
-                        <a:lstStyle/>
-                        <a:p>
-                          <a14:m>
-                            <m:oMathPara xmlns:m="http://schemas.openxmlformats.org/officeDocument/2006/math">
-                              <m:oMathParaPr>
-                                <m:jc m:val="centerGroup"/>
-                              </m:oMathParaPr>
-                              <m:oMath xmlns:m="http://schemas.openxmlformats.org/officeDocument/2006/math">
-                                <m:r>
-                                  <a:rPr lang="en-US" b="0" i="1" smtClean="0">
-                                    <a:latin typeface="Cambria Math" panose="02040503050406030204" pitchFamily="18" charset="0"/>
-                                  </a:rPr>
-                                  <m:t>𝜌</m:t>
-                                </m:r>
-                              </m:oMath>
-                            </m:oMathPara>
-                          </a14:m>
-                          <a:endParaRPr lang="fr-CH" dirty="0"/>
-                        </a:p>
-                      </a:txBody>
-                      <a:tcPr/>
-                    </a:tc>
-                    <a:tc>
-                      <a:txBody>
-                        <a:bodyPr/>
-                        <a:lstStyle/>
-                        <a:p>
-                          <a14:m>
-                            <m:oMathPara xmlns:m="http://schemas.openxmlformats.org/officeDocument/2006/math">
-                              <m:oMathParaPr>
-                                <m:jc m:val="centerGroup"/>
-                              </m:oMathParaPr>
-                              <m:oMath xmlns:m="http://schemas.openxmlformats.org/officeDocument/2006/math">
-                                <m:r>
-                                  <a:rPr lang="en-US" b="0" i="1" smtClean="0">
-                                    <a:latin typeface="Cambria Math" panose="02040503050406030204" pitchFamily="18" charset="0"/>
-                                  </a:rPr>
-                                  <m:t>𝑘𝑔</m:t>
-                                </m:r>
-                                <m:r>
-                                  <a:rPr lang="en-US" b="0" i="1" smtClean="0">
-                                    <a:latin typeface="Cambria Math" panose="02040503050406030204" pitchFamily="18" charset="0"/>
-                                  </a:rPr>
-                                  <m:t>/</m:t>
-                                </m:r>
-                                <m:sSup>
-                                  <m:sSupPr>
-                                    <m:ctrlPr>
-                                      <a:rPr lang="en-US" b="0" i="1" smtClean="0">
-                                        <a:latin typeface="Cambria Math" panose="02040503050406030204" pitchFamily="18" charset="0"/>
-                                      </a:rPr>
-                                    </m:ctrlPr>
-                                  </m:sSupPr>
-                                  <m:e>
-                                    <m:r>
-                                      <a:rPr lang="en-US" b="0" i="1" smtClean="0">
-                                        <a:latin typeface="Cambria Math" panose="02040503050406030204" pitchFamily="18" charset="0"/>
-                                      </a:rPr>
-                                      <m:t>𝑚</m:t>
-                                    </m:r>
-                                  </m:e>
-                                  <m:sup>
-                                    <m:r>
-                                      <a:rPr lang="en-US" b="0" i="1" smtClean="0">
-                                        <a:latin typeface="Cambria Math" panose="02040503050406030204" pitchFamily="18" charset="0"/>
-                                      </a:rPr>
-                                      <m:t>3</m:t>
-                                    </m:r>
-                                  </m:sup>
-                                </m:sSup>
-                              </m:oMath>
-                            </m:oMathPara>
-                          </a14:m>
-                          <a:endParaRPr lang="fr-CH" dirty="0"/>
-                        </a:p>
-                      </a:txBody>
-                      <a:tcPr/>
-                    </a:tc>
-                    <a:tc>
-                      <a:txBody>
-                        <a:bodyPr/>
-                        <a:lstStyle/>
-                        <a:p>
-                          <a:r>
-                            <a:rPr lang="ru-RU" dirty="0"/>
-                            <a:t>Плотность стержня</a:t>
-                          </a:r>
-                          <a:endParaRPr lang="fr-CH" dirty="0"/>
-                        </a:p>
-                      </a:txBody>
-                      <a:tcPr/>
-                    </a:tc>
-                    <a:extLst>
-                      <a:ext uri="{0D108BD9-81ED-4DB2-BD59-A6C34878D82A}">
-                        <a16:rowId xmlns:a16="http://schemas.microsoft.com/office/drawing/2014/main" val="1772322357"/>
-                      </a:ext>
-                    </a:extLst>
-                  </a:tr>
-                  <a:tr h="489624">
-                    <a:tc>
-                      <a:txBody>
-                        <a:bodyPr/>
-                        <a:lstStyle/>
-                        <a:p>
-                          <a14:m>
-                            <m:oMathPara xmlns:m="http://schemas.openxmlformats.org/officeDocument/2006/math">
-                              <m:oMathParaPr>
-                                <m:jc m:val="centerGroup"/>
-                              </m:oMathParaPr>
-                              <m:oMath xmlns:m="http://schemas.openxmlformats.org/officeDocument/2006/math">
-                                <m:r>
-                                  <a:rPr lang="en-US" b="0" i="1" smtClean="0">
-                                    <a:latin typeface="Cambria Math" panose="02040503050406030204" pitchFamily="18" charset="0"/>
-                                  </a:rPr>
-                                  <m:t>𝑅</m:t>
-                                </m:r>
-                              </m:oMath>
-                            </m:oMathPara>
-                          </a14:m>
-                          <a:endParaRPr lang="fr-CH" dirty="0"/>
-                        </a:p>
-                      </a:txBody>
-                      <a:tcPr/>
-                    </a:tc>
-                    <a:tc>
-                      <a:txBody>
-                        <a:bodyPr/>
-                        <a:lstStyle/>
-                        <a:p>
-                          <a14:m>
-                            <m:oMathPara xmlns:m="http://schemas.openxmlformats.org/officeDocument/2006/math">
-                              <m:oMathParaPr>
-                                <m:jc m:val="centerGroup"/>
-                              </m:oMathParaPr>
-                              <m:oMath xmlns:m="http://schemas.openxmlformats.org/officeDocument/2006/math">
-                                <m:r>
-                                  <a:rPr lang="en-US" b="0" i="1" smtClean="0">
-                                    <a:latin typeface="Cambria Math" panose="02040503050406030204" pitchFamily="18" charset="0"/>
-                                  </a:rPr>
-                                  <m:t>𝑚</m:t>
-                                </m:r>
-                              </m:oMath>
-                            </m:oMathPara>
-                          </a14:m>
-                          <a:endParaRPr lang="fr-CH" dirty="0"/>
-                        </a:p>
-                      </a:txBody>
-                      <a:tcPr/>
-                    </a:tc>
-                    <a:tc>
-                      <a:txBody>
-                        <a:bodyPr/>
-                        <a:lstStyle/>
-                        <a:p>
-                          <a:r>
-                            <a:rPr lang="ru-RU" dirty="0"/>
-                            <a:t>Радиус сечения</a:t>
-                          </a:r>
-                          <a:endParaRPr lang="fr-CH" dirty="0"/>
-                        </a:p>
-                      </a:txBody>
-                      <a:tcPr/>
-                    </a:tc>
-                    <a:extLst>
-                      <a:ext uri="{0D108BD9-81ED-4DB2-BD59-A6C34878D82A}">
-                        <a16:rowId xmlns:a16="http://schemas.microsoft.com/office/drawing/2014/main" val="284929364"/>
-                      </a:ext>
-                    </a:extLst>
-                  </a:tr>
-                  <a:tr h="279785">
-                    <a:tc>
-                      <a:txBody>
-                        <a:bodyPr/>
-                        <a:lstStyle/>
-                        <a:p>
-                          <a14:m>
-                            <m:oMathPara xmlns:m="http://schemas.openxmlformats.org/officeDocument/2006/math">
-                              <m:oMathParaPr>
-                                <m:jc m:val="centerGroup"/>
-                              </m:oMathParaPr>
-                              <m:oMath xmlns:m="http://schemas.openxmlformats.org/officeDocument/2006/math">
-                                <m:r>
-                                  <a:rPr lang="en-US" b="0" i="1" smtClean="0">
-                                    <a:latin typeface="Cambria Math" panose="02040503050406030204" pitchFamily="18" charset="0"/>
-                                  </a:rPr>
-                                  <m:t>𝐸</m:t>
-                                </m:r>
-                              </m:oMath>
-                            </m:oMathPara>
-                          </a14:m>
-                          <a:endParaRPr lang="fr-CH" dirty="0"/>
-                        </a:p>
-                      </a:txBody>
-                      <a:tcPr/>
-                    </a:tc>
-                    <a:tc>
-                      <a:txBody>
-                        <a:bodyPr/>
-                        <a:lstStyle/>
-                        <a:p>
-                          <a14:m>
-                            <m:oMathPara xmlns:m="http://schemas.openxmlformats.org/officeDocument/2006/math">
-                              <m:oMathParaPr>
-                                <m:jc m:val="centerGroup"/>
-                              </m:oMathParaPr>
-                              <m:oMath xmlns:m="http://schemas.openxmlformats.org/officeDocument/2006/math">
-                                <m:r>
-                                  <a:rPr lang="en-US" b="0" i="1" smtClean="0">
-                                    <a:latin typeface="Cambria Math" panose="02040503050406030204" pitchFamily="18" charset="0"/>
-                                  </a:rPr>
-                                  <m:t>𝑘𝑔</m:t>
-                                </m:r>
-                                <m:r>
-                                  <a:rPr lang="en-US" b="0" i="1" smtClean="0">
-                                    <a:latin typeface="Cambria Math" panose="02040503050406030204" pitchFamily="18" charset="0"/>
-                                  </a:rPr>
-                                  <m:t>/(</m:t>
-                                </m:r>
-                                <m:r>
-                                  <a:rPr lang="en-US" b="0" i="1" smtClean="0">
-                                    <a:latin typeface="Cambria Math" panose="02040503050406030204" pitchFamily="18" charset="0"/>
-                                  </a:rPr>
-                                  <m:t>𝑚</m:t>
-                                </m:r>
-                                <m:r>
-                                  <a:rPr lang="en-US" b="0" i="1" smtClean="0">
-                                    <a:latin typeface="Cambria Math" panose="02040503050406030204" pitchFamily="18" charset="0"/>
-                                  </a:rPr>
-                                  <m:t>⋅</m:t>
-                                </m:r>
-                                <m:r>
-                                  <a:rPr lang="en-US" b="0" i="1" smtClean="0">
-                                    <a:latin typeface="Cambria Math" panose="02040503050406030204" pitchFamily="18" charset="0"/>
-                                  </a:rPr>
-                                  <m:t>𝑠</m:t>
-                                </m:r>
-                                <m:r>
-                                  <a:rPr lang="en-US" b="0" i="1" smtClean="0">
-                                    <a:latin typeface="Cambria Math" panose="02040503050406030204" pitchFamily="18" charset="0"/>
-                                  </a:rPr>
-                                  <m:t>)</m:t>
-                                </m:r>
-                              </m:oMath>
-                            </m:oMathPara>
-                          </a14:m>
-                          <a:endParaRPr lang="fr-CH" dirty="0"/>
-                        </a:p>
-                      </a:txBody>
-                      <a:tcPr/>
-                    </a:tc>
-                    <a:tc>
-                      <a:txBody>
-                        <a:bodyPr/>
-                        <a:lstStyle/>
-                        <a:p>
-                          <a:r>
-                            <a:rPr lang="ru-RU" dirty="0"/>
-                            <a:t>Модуль Юнга</a:t>
-                          </a:r>
-                          <a:endParaRPr lang="fr-CH" dirty="0"/>
-                        </a:p>
-                      </a:txBody>
-                      <a:tcPr/>
-                    </a:tc>
-                    <a:extLst>
-                      <a:ext uri="{0D108BD9-81ED-4DB2-BD59-A6C34878D82A}">
-                        <a16:rowId xmlns:a16="http://schemas.microsoft.com/office/drawing/2014/main" val="1576472783"/>
-                      </a:ext>
-                    </a:extLst>
-                  </a:tr>
-                </a:tbl>
-              </a:graphicData>
-            </a:graphic>
-          </p:graphicFrame>
-        </mc:Choice>
-        <mc:Fallback>
-          <p:graphicFrame>
-            <p:nvGraphicFramePr>
-              <p:cNvPr id="8" name="Table 8">
-                <a:extLst>
-                  <a:ext uri="{FF2B5EF4-FFF2-40B4-BE49-F238E27FC236}">
-                    <a16:creationId xmlns:a16="http://schemas.microsoft.com/office/drawing/2014/main" id="{2C6F59B2-DCEE-4659-B6E3-12BAF222332E}"/>
-                  </a:ext>
-                </a:extLst>
-              </p:cNvPr>
-              <p:cNvGraphicFramePr>
-                <a:graphicFrameLocks noGrp="1"/>
-              </p:cNvGraphicFramePr>
-              <p:nvPr>
-                <p:extLst>
-                  <p:ext uri="{D42A27DB-BD31-4B8C-83A1-F6EECF244321}">
-                    <p14:modId xmlns:p14="http://schemas.microsoft.com/office/powerpoint/2010/main" val="1239617158"/>
-                  </p:ext>
-                </p:extLst>
-              </p:nvPr>
-            </p:nvGraphicFramePr>
-            <p:xfrm>
-              <a:off x="564196" y="4185993"/>
-              <a:ext cx="5492882" cy="1586904"/>
-            </p:xfrm>
-            <a:graphic>
-              <a:graphicData uri="http://schemas.openxmlformats.org/drawingml/2006/table">
-                <a:tbl>
-                  <a:tblPr firstRow="1" bandRow="1">
-                    <a:tableStyleId>{5C22544A-7EE6-4342-B048-85BDC9FD1C3A}</a:tableStyleId>
-                  </a:tblPr>
-                  <a:tblGrid>
-                    <a:gridCol w="1582143">
-                      <a:extLst>
-                        <a:ext uri="{9D8B030D-6E8A-4147-A177-3AD203B41FA5}">
-                          <a16:colId xmlns:a16="http://schemas.microsoft.com/office/drawing/2014/main" val="219512031"/>
-                        </a:ext>
-                      </a:extLst>
-                    </a:gridCol>
-                    <a:gridCol w="1511085">
-                      <a:extLst>
-                        <a:ext uri="{9D8B030D-6E8A-4147-A177-3AD203B41FA5}">
-                          <a16:colId xmlns:a16="http://schemas.microsoft.com/office/drawing/2014/main" val="2064641327"/>
-                        </a:ext>
-                      </a:extLst>
-                    </a:gridCol>
-                    <a:gridCol w="2399654">
-                      <a:extLst>
-                        <a:ext uri="{9D8B030D-6E8A-4147-A177-3AD203B41FA5}">
-                          <a16:colId xmlns:a16="http://schemas.microsoft.com/office/drawing/2014/main" val="3570533111"/>
-                        </a:ext>
-                      </a:extLst>
-                    </a:gridCol>
-                  </a:tblGrid>
-                  <a:tr h="365760">
-                    <a:tc>
-                      <a:txBody>
-                        <a:bodyPr/>
-                        <a:lstStyle/>
-                        <a:p>
-                          <a:r>
-                            <a:rPr lang="ru-RU" dirty="0"/>
-                            <a:t>Коэффициент</a:t>
-                          </a:r>
-                          <a:endParaRPr lang="fr-CH" dirty="0"/>
-                        </a:p>
-                      </a:txBody>
-                      <a:tcPr/>
-                    </a:tc>
-                    <a:tc>
-                      <a:txBody>
-                        <a:bodyPr/>
-                        <a:lstStyle/>
-                        <a:p>
-                          <a:r>
-                            <a:rPr lang="ru-RU" dirty="0"/>
-                            <a:t>Размерность</a:t>
-                          </a:r>
-                          <a:endParaRPr lang="fr-CH" dirty="0"/>
-                        </a:p>
-                      </a:txBody>
-                      <a:tcPr/>
-                    </a:tc>
-                    <a:tc>
-                      <a:txBody>
-                        <a:bodyPr/>
-                        <a:lstStyle/>
-                        <a:p>
-                          <a:r>
-                            <a:rPr lang="ru-RU" dirty="0"/>
-                            <a:t>Описание</a:t>
-                          </a:r>
-                          <a:endParaRPr lang="fr-CH" dirty="0"/>
-                        </a:p>
-                      </a:txBody>
-                      <a:tcPr/>
-                    </a:tc>
-                    <a:extLst>
-                      <a:ext uri="{0D108BD9-81ED-4DB2-BD59-A6C34878D82A}">
-                        <a16:rowId xmlns:a16="http://schemas.microsoft.com/office/drawing/2014/main" val="3609856121"/>
-                      </a:ext>
-                    </a:extLst>
-                  </a:tr>
-                  <a:tr h="365760">
-                    <a:tc>
-                      <a:txBody>
-                        <a:bodyPr/>
-                        <a:lstStyle/>
-                        <a:p>
-                          <a:endParaRPr lang="fr-FR"/>
-                        </a:p>
-                      </a:txBody>
-                      <a:tcPr>
-                        <a:blipFill>
-                          <a:blip r:embed="rId3"/>
-                          <a:stretch>
-                            <a:fillRect l="-385" t="-108333" r="-248462" b="-261667"/>
-                          </a:stretch>
-                        </a:blipFill>
-                      </a:tcPr>
-                    </a:tc>
-                    <a:tc>
-                      <a:txBody>
-                        <a:bodyPr/>
-                        <a:lstStyle/>
-                        <a:p>
-                          <a:endParaRPr lang="fr-FR"/>
-                        </a:p>
-                      </a:txBody>
-                      <a:tcPr>
-                        <a:blipFill>
-                          <a:blip r:embed="rId3"/>
-                          <a:stretch>
-                            <a:fillRect l="-105242" t="-108333" r="-160484" b="-261667"/>
-                          </a:stretch>
-                        </a:blipFill>
-                      </a:tcPr>
-                    </a:tc>
-                    <a:tc>
-                      <a:txBody>
-                        <a:bodyPr/>
-                        <a:lstStyle/>
-                        <a:p>
-                          <a:r>
-                            <a:rPr lang="ru-RU" dirty="0"/>
-                            <a:t>Плотность стержня</a:t>
-                          </a:r>
-                          <a:endParaRPr lang="fr-CH" dirty="0"/>
-                        </a:p>
-                      </a:txBody>
-                      <a:tcPr/>
-                    </a:tc>
-                    <a:extLst>
-                      <a:ext uri="{0D108BD9-81ED-4DB2-BD59-A6C34878D82A}">
-                        <a16:rowId xmlns:a16="http://schemas.microsoft.com/office/drawing/2014/main" val="1772322357"/>
-                      </a:ext>
-                    </a:extLst>
-                  </a:tr>
-                  <a:tr h="489624">
-                    <a:tc>
-                      <a:txBody>
-                        <a:bodyPr/>
-                        <a:lstStyle/>
-                        <a:p>
-                          <a:endParaRPr lang="fr-FR"/>
-                        </a:p>
-                      </a:txBody>
-                      <a:tcPr>
-                        <a:blipFill>
-                          <a:blip r:embed="rId3"/>
-                          <a:stretch>
-                            <a:fillRect l="-385" t="-154321" r="-248462" b="-93827"/>
-                          </a:stretch>
-                        </a:blipFill>
-                      </a:tcPr>
-                    </a:tc>
-                    <a:tc>
-                      <a:txBody>
-                        <a:bodyPr/>
-                        <a:lstStyle/>
-                        <a:p>
-                          <a:endParaRPr lang="fr-FR"/>
-                        </a:p>
-                      </a:txBody>
-                      <a:tcPr>
-                        <a:blipFill>
-                          <a:blip r:embed="rId3"/>
-                          <a:stretch>
-                            <a:fillRect l="-105242" t="-154321" r="-160484" b="-93827"/>
-                          </a:stretch>
-                        </a:blipFill>
-                      </a:tcPr>
-                    </a:tc>
-                    <a:tc>
-                      <a:txBody>
-                        <a:bodyPr/>
-                        <a:lstStyle/>
-                        <a:p>
-                          <a:r>
-                            <a:rPr lang="ru-RU" dirty="0"/>
-                            <a:t>Радиус сечения</a:t>
-                          </a:r>
-                          <a:endParaRPr lang="fr-CH" dirty="0"/>
-                        </a:p>
-                      </a:txBody>
-                      <a:tcPr/>
-                    </a:tc>
-                    <a:extLst>
-                      <a:ext uri="{0D108BD9-81ED-4DB2-BD59-A6C34878D82A}">
-                        <a16:rowId xmlns:a16="http://schemas.microsoft.com/office/drawing/2014/main" val="284929364"/>
-                      </a:ext>
-                    </a:extLst>
-                  </a:tr>
-                  <a:tr h="365760">
-                    <a:tc>
-                      <a:txBody>
-                        <a:bodyPr/>
-                        <a:lstStyle/>
-                        <a:p>
-                          <a:endParaRPr lang="fr-FR"/>
-                        </a:p>
-                      </a:txBody>
-                      <a:tcPr>
-                        <a:blipFill>
-                          <a:blip r:embed="rId3"/>
-                          <a:stretch>
-                            <a:fillRect l="-385" t="-343333" r="-248462" b="-26667"/>
-                          </a:stretch>
-                        </a:blipFill>
-                      </a:tcPr>
-                    </a:tc>
-                    <a:tc>
-                      <a:txBody>
-                        <a:bodyPr/>
-                        <a:lstStyle/>
-                        <a:p>
-                          <a:endParaRPr lang="fr-FR"/>
-                        </a:p>
-                      </a:txBody>
-                      <a:tcPr>
-                        <a:blipFill>
-                          <a:blip r:embed="rId3"/>
-                          <a:stretch>
-                            <a:fillRect l="-105242" t="-343333" r="-160484" b="-26667"/>
-                          </a:stretch>
-                        </a:blipFill>
-                      </a:tcPr>
-                    </a:tc>
-                    <a:tc>
-                      <a:txBody>
-                        <a:bodyPr/>
-                        <a:lstStyle/>
-                        <a:p>
-                          <a:r>
-                            <a:rPr lang="ru-RU" dirty="0"/>
-                            <a:t>Модуль Юнга</a:t>
-                          </a:r>
-                          <a:endParaRPr lang="fr-CH" dirty="0"/>
-                        </a:p>
-                      </a:txBody>
-                      <a:tcPr/>
-                    </a:tc>
-                    <a:extLst>
-                      <a:ext uri="{0D108BD9-81ED-4DB2-BD59-A6C34878D82A}">
-                        <a16:rowId xmlns:a16="http://schemas.microsoft.com/office/drawing/2014/main" val="1576472783"/>
-                      </a:ext>
-                    </a:extLst>
-                  </a:tr>
-                </a:tbl>
-              </a:graphicData>
-            </a:graphic>
-          </p:graphicFrame>
-        </mc:Fallback>
-      </mc:AlternateContent>
-    </p:spTree>
-    <p:extLst>
-      <p:ext uri="{BB962C8B-B14F-4D97-AF65-F5344CB8AC3E}">
-        <p14:creationId xmlns:p14="http://schemas.microsoft.com/office/powerpoint/2010/main" val="843577549"/>
-      </p:ext>
-    </p:extLst>
-  </p:cSld>
-  <p:clrMapOvr>
-    <a:masterClrMapping/>
-  </p:clrMapOvr>
-</p:sld>
-</file>
-
-<file path=ppt/slides/slide3.xml><?xml version="1.0" encoding="utf-8"?>
-<p:sld xmlns:a="http://schemas.openxmlformats.org/drawingml/2006/main" xmlns:r="http://schemas.openxmlformats.org/officeDocument/2006/relationships" xmlns:p="http://schemas.openxmlformats.org/presentationml/2006/main">
-  <p:cSld>
-    <p:spTree>
-      <p:nvGrpSpPr>
-        <p:cNvPr id="1" name=""/>
-        <p:cNvGrpSpPr/>
-        <p:nvPr/>
-      </p:nvGrpSpPr>
-      <p:grpSpPr>
-        <a:xfrm>
-          <a:off x="0" y="0"/>
-          <a:ext cx="0" cy="0"/>
-          <a:chOff x="0" y="0"/>
-          <a:chExt cx="0" cy="0"/>
-        </a:xfrm>
-      </p:grpSpPr>
-      <p:sp>
-        <p:nvSpPr>
-          <p:cNvPr id="3" name="Заголовок 2">
-            <a:extLst>
-              <a:ext uri="{FF2B5EF4-FFF2-40B4-BE49-F238E27FC236}">
-                <a16:creationId xmlns:a16="http://schemas.microsoft.com/office/drawing/2014/main" id="{E2EAF03B-EC26-1D47-94AC-C75942861D6C}"/>
-              </a:ext>
-            </a:extLst>
-          </p:cNvPr>
-          <p:cNvSpPr>
-            <a:spLocks noGrp="1"/>
-          </p:cNvSpPr>
-          <p:nvPr>
-            <p:ph type="title"/>
-          </p:nvPr>
-        </p:nvSpPr>
-        <p:spPr/>
-        <p:txBody>
-          <a:bodyPr/>
-          <a:lstStyle/>
-          <a:p>
-            <a:r>
-              <a:rPr lang="ru-RU" dirty="0"/>
-              <a:t>Схема Кранка – Николсон</a:t>
-            </a:r>
-          </a:p>
-        </p:txBody>
-      </p:sp>
-      <mc:AlternateContent xmlns:mc="http://schemas.openxmlformats.org/markup-compatibility/2006">
-        <mc:Choice xmlns:a14="http://schemas.microsoft.com/office/drawing/2010/main" Requires="a14">
+      <mc:AlternateContent xmlns:mc="http://schemas.openxmlformats.org/markup-compatibility/2006" xmlns:a14="http://schemas.microsoft.com/office/drawing/2010/main">
+        <mc:Choice Requires="a14">
           <p:sp>
             <p:nvSpPr>
               <p:cNvPr id="4" name="Текст 3">
@@ -16681,6 +14968,1728 @@
                 </a:r>
               </a:p>
               <a:p>
+                <a:pPr/>
+                <a14:m>
+                  <m:oMathPara xmlns:m="http://schemas.openxmlformats.org/officeDocument/2006/math">
+                    <m:oMathParaPr>
+                      <m:jc m:val="centerGroup"/>
+                    </m:oMathParaPr>
+                    <m:oMath xmlns:m="http://schemas.openxmlformats.org/officeDocument/2006/math">
+                      <m:r>
+                        <a:rPr lang="en-US" i="1">
+                          <a:latin typeface="Cambria Math" panose="02040503050406030204" pitchFamily="18" charset="0"/>
+                        </a:rPr>
+                        <m:t>𝜈</m:t>
+                      </m:r>
+                      <m:r>
+                        <a:rPr lang="en-US" i="1">
+                          <a:latin typeface="Cambria Math" panose="02040503050406030204" pitchFamily="18" charset="0"/>
+                        </a:rPr>
+                        <m:t>=</m:t>
+                      </m:r>
+                      <m:r>
+                        <a:rPr lang="en-US" i="1">
+                          <a:latin typeface="Cambria Math" panose="02040503050406030204" pitchFamily="18" charset="0"/>
+                        </a:rPr>
+                        <m:t>𝐶</m:t>
+                      </m:r>
+                      <m:sSup>
+                        <m:sSupPr>
+                          <m:ctrlPr>
+                            <a:rPr lang="en-US" i="1">
+                              <a:latin typeface="Cambria Math" panose="02040503050406030204" pitchFamily="18" charset="0"/>
+                            </a:rPr>
+                          </m:ctrlPr>
+                        </m:sSupPr>
+                        <m:e>
+                          <m:r>
+                            <a:rPr lang="en-US" i="1">
+                              <a:latin typeface="Cambria Math" panose="02040503050406030204" pitchFamily="18" charset="0"/>
+                            </a:rPr>
+                            <m:t>𝜏</m:t>
+                          </m:r>
+                        </m:e>
+                        <m:sup>
+                          <m:r>
+                            <a:rPr lang="en-US" i="1">
+                              <a:latin typeface="Cambria Math" panose="02040503050406030204" pitchFamily="18" charset="0"/>
+                            </a:rPr>
+                            <m:t>2</m:t>
+                          </m:r>
+                        </m:sup>
+                      </m:sSup>
+                      <m:r>
+                        <a:rPr lang="en-US" i="1">
+                          <a:latin typeface="Cambria Math" panose="02040503050406030204" pitchFamily="18" charset="0"/>
+                        </a:rPr>
+                        <m:t>/</m:t>
+                      </m:r>
+                      <m:sSup>
+                        <m:sSupPr>
+                          <m:ctrlPr>
+                            <a:rPr lang="en-US" i="1">
+                              <a:latin typeface="Cambria Math" panose="02040503050406030204" pitchFamily="18" charset="0"/>
+                            </a:rPr>
+                          </m:ctrlPr>
+                        </m:sSupPr>
+                        <m:e>
+                          <m:r>
+                            <a:rPr lang="en-US" i="1">
+                              <a:latin typeface="Cambria Math" panose="02040503050406030204" pitchFamily="18" charset="0"/>
+                            </a:rPr>
+                            <m:t>h</m:t>
+                          </m:r>
+                        </m:e>
+                        <m:sup>
+                          <m:r>
+                            <a:rPr lang="en-US" i="1">
+                              <a:latin typeface="Cambria Math" panose="02040503050406030204" pitchFamily="18" charset="0"/>
+                            </a:rPr>
+                            <m:t>4</m:t>
+                          </m:r>
+                        </m:sup>
+                      </m:sSup>
+                      <m:r>
+                        <a:rPr lang="en-US" i="1">
+                          <a:latin typeface="Cambria Math" panose="02040503050406030204" pitchFamily="18" charset="0"/>
+                        </a:rPr>
+                        <m:t>,  </m:t>
+                      </m:r>
+                      <m:r>
+                        <a:rPr lang="en-US" i="1">
+                          <a:latin typeface="Cambria Math" panose="02040503050406030204" pitchFamily="18" charset="0"/>
+                        </a:rPr>
+                        <m:t>𝜇</m:t>
+                      </m:r>
+                      <m:r>
+                        <a:rPr lang="en-US" i="1">
+                          <a:latin typeface="Cambria Math" panose="02040503050406030204" pitchFamily="18" charset="0"/>
+                        </a:rPr>
+                        <m:t>=</m:t>
+                      </m:r>
+                      <m:r>
+                        <a:rPr lang="en-US" i="1">
+                          <a:latin typeface="Cambria Math" panose="02040503050406030204" pitchFamily="18" charset="0"/>
+                        </a:rPr>
+                        <m:t>𝐷</m:t>
+                      </m:r>
+                      <m:r>
+                        <a:rPr lang="en-US" i="1">
+                          <a:latin typeface="Cambria Math" panose="02040503050406030204" pitchFamily="18" charset="0"/>
+                        </a:rPr>
+                        <m:t>/</m:t>
+                      </m:r>
+                      <m:sSup>
+                        <m:sSupPr>
+                          <m:ctrlPr>
+                            <a:rPr lang="en-US" i="1">
+                              <a:latin typeface="Cambria Math" panose="02040503050406030204" pitchFamily="18" charset="0"/>
+                            </a:rPr>
+                          </m:ctrlPr>
+                        </m:sSupPr>
+                        <m:e>
+                          <m:r>
+                            <a:rPr lang="en-US" i="1">
+                              <a:latin typeface="Cambria Math" panose="02040503050406030204" pitchFamily="18" charset="0"/>
+                            </a:rPr>
+                            <m:t>h</m:t>
+                          </m:r>
+                        </m:e>
+                        <m:sup>
+                          <m:r>
+                            <a:rPr lang="en-US" i="1">
+                              <a:latin typeface="Cambria Math" panose="02040503050406030204" pitchFamily="18" charset="0"/>
+                            </a:rPr>
+                            <m:t>2</m:t>
+                          </m:r>
+                        </m:sup>
+                      </m:sSup>
+                    </m:oMath>
+                  </m:oMathPara>
+                </a14:m>
+                <a:endParaRPr lang="ru-RU" dirty="0"/>
+              </a:p>
+              <a:p>
+                <a:endParaRPr lang="ru-RU" dirty="0"/>
+              </a:p>
+              <a:p>
+                <a:endParaRPr lang="ru-RU" dirty="0"/>
+              </a:p>
+            </p:txBody>
+          </p:sp>
+        </mc:Choice>
+        <mc:Fallback xmlns="">
+          <p:sp>
+            <p:nvSpPr>
+              <p:cNvPr id="4" name="Текст 3">
+                <a:extLst>
+                  <a:ext uri="{FF2B5EF4-FFF2-40B4-BE49-F238E27FC236}">
+                    <a16:creationId xmlns:a16="http://schemas.microsoft.com/office/drawing/2014/main" id="{53356540-7218-FF4B-B6BC-5BD291A372E2}"/>
+                  </a:ext>
+                </a:extLst>
+              </p:cNvPr>
+              <p:cNvSpPr>
+                <a:spLocks noGrp="1" noRot="1" noChangeAspect="1" noMove="1" noResize="1" noEditPoints="1" noAdjustHandles="1" noChangeArrowheads="1" noChangeShapeType="1" noTextEdit="1"/>
+              </p:cNvSpPr>
+              <p:nvPr>
+                <p:ph type="body" sz="quarter" idx="12"/>
+              </p:nvPr>
+            </p:nvSpPr>
+            <p:spPr>
+              <a:blipFill>
+                <a:blip r:embed="rId2"/>
+                <a:stretch>
+                  <a:fillRect l="-1858" t="-1436"/>
+                </a:stretch>
+              </a:blipFill>
+            </p:spPr>
+            <p:txBody>
+              <a:bodyPr/>
+              <a:lstStyle/>
+              <a:p>
+                <a:r>
+                  <a:rPr lang="fr-CH">
+                    <a:noFill/>
+                  </a:rPr>
+                  <a:t> </a:t>
+                </a:r>
+              </a:p>
+            </p:txBody>
+          </p:sp>
+        </mc:Fallback>
+      </mc:AlternateContent>
+      <p:sp>
+        <p:nvSpPr>
+          <p:cNvPr id="5" name="Текст 4">
+            <a:extLst>
+              <a:ext uri="{FF2B5EF4-FFF2-40B4-BE49-F238E27FC236}">
+                <a16:creationId xmlns:a16="http://schemas.microsoft.com/office/drawing/2014/main" id="{3EB29DC1-D5D4-FB41-9E2D-AA4750D0CC8B}"/>
+              </a:ext>
+            </a:extLst>
+          </p:cNvPr>
+          <p:cNvSpPr>
+            <a:spLocks noGrp="1"/>
+          </p:cNvSpPr>
+          <p:nvPr>
+            <p:ph type="body" sz="quarter" idx="13"/>
+          </p:nvPr>
+        </p:nvSpPr>
+        <p:spPr/>
+        <p:txBody>
+          <a:bodyPr/>
+          <a:lstStyle/>
+          <a:p>
+            <a:r>
+              <a:rPr lang="ru-RU" dirty="0"/>
+              <a:t>Факультет экономических наук</a:t>
+            </a:r>
+          </a:p>
+          <a:p>
+            <a:r>
+              <a:rPr lang="ru-RU" dirty="0"/>
+              <a:t>Департамент математики</a:t>
+            </a:r>
+          </a:p>
+        </p:txBody>
+      </p:sp>
+      <p:sp>
+        <p:nvSpPr>
+          <p:cNvPr id="6" name="Текст 5">
+            <a:extLst>
+              <a:ext uri="{FF2B5EF4-FFF2-40B4-BE49-F238E27FC236}">
+                <a16:creationId xmlns:a16="http://schemas.microsoft.com/office/drawing/2014/main" id="{B5B6DD1A-BEFA-D842-9B7A-78D7BD1A5259}"/>
+              </a:ext>
+            </a:extLst>
+          </p:cNvPr>
+          <p:cNvSpPr>
+            <a:spLocks noGrp="1"/>
+          </p:cNvSpPr>
+          <p:nvPr>
+            <p:ph type="body" sz="quarter" idx="14"/>
+          </p:nvPr>
+        </p:nvSpPr>
+        <p:spPr/>
+        <p:txBody>
+          <a:bodyPr/>
+          <a:lstStyle/>
+          <a:p>
+            <a:r>
+              <a:rPr lang="ru-RU" dirty="0"/>
+              <a:t>Уравнение поперечных колебаний стержня</a:t>
+            </a:r>
+          </a:p>
+        </p:txBody>
+      </p:sp>
+      <p:sp>
+        <p:nvSpPr>
+          <p:cNvPr id="7" name="Текст 6">
+            <a:extLst>
+              <a:ext uri="{FF2B5EF4-FFF2-40B4-BE49-F238E27FC236}">
+                <a16:creationId xmlns:a16="http://schemas.microsoft.com/office/drawing/2014/main" id="{88968744-3B75-9B47-92FD-77E1E725F232}"/>
+              </a:ext>
+            </a:extLst>
+          </p:cNvPr>
+          <p:cNvSpPr>
+            <a:spLocks noGrp="1"/>
+          </p:cNvSpPr>
+          <p:nvPr>
+            <p:ph type="body" sz="quarter" idx="15"/>
+          </p:nvPr>
+        </p:nvSpPr>
+        <p:spPr/>
+        <p:txBody>
+          <a:bodyPr/>
+          <a:lstStyle/>
+          <a:p>
+            <a:r>
+              <a:rPr lang="ru-RU" dirty="0"/>
+              <a:t>Введение</a:t>
+            </a:r>
+          </a:p>
+        </p:txBody>
+      </p:sp>
+      <mc:AlternateContent xmlns:mc="http://schemas.openxmlformats.org/markup-compatibility/2006" xmlns:a14="http://schemas.microsoft.com/office/drawing/2010/main">
+        <mc:Choice Requires="a14">
+          <p:graphicFrame>
+            <p:nvGraphicFramePr>
+              <p:cNvPr id="8" name="Table 8">
+                <a:extLst>
+                  <a:ext uri="{FF2B5EF4-FFF2-40B4-BE49-F238E27FC236}">
+                    <a16:creationId xmlns:a16="http://schemas.microsoft.com/office/drawing/2014/main" id="{2C6F59B2-DCEE-4659-B6E3-12BAF222332E}"/>
+                  </a:ext>
+                </a:extLst>
+              </p:cNvPr>
+              <p:cNvGraphicFramePr>
+                <a:graphicFrameLocks noGrp="1"/>
+              </p:cNvGraphicFramePr>
+              <p:nvPr>
+                <p:extLst>
+                  <p:ext uri="{D42A27DB-BD31-4B8C-83A1-F6EECF244321}">
+                    <p14:modId xmlns:p14="http://schemas.microsoft.com/office/powerpoint/2010/main" val="1239617158"/>
+                  </p:ext>
+                </p:extLst>
+              </p:nvPr>
+            </p:nvGraphicFramePr>
+            <p:xfrm>
+              <a:off x="564196" y="4185993"/>
+              <a:ext cx="5492882" cy="1586904"/>
+            </p:xfrm>
+            <a:graphic>
+              <a:graphicData uri="http://schemas.openxmlformats.org/drawingml/2006/table">
+                <a:tbl>
+                  <a:tblPr firstRow="1" bandRow="1">
+                    <a:tableStyleId>{5C22544A-7EE6-4342-B048-85BDC9FD1C3A}</a:tableStyleId>
+                  </a:tblPr>
+                  <a:tblGrid>
+                    <a:gridCol w="1582143">
+                      <a:extLst>
+                        <a:ext uri="{9D8B030D-6E8A-4147-A177-3AD203B41FA5}">
+                          <a16:colId xmlns:a16="http://schemas.microsoft.com/office/drawing/2014/main" val="219512031"/>
+                        </a:ext>
+                      </a:extLst>
+                    </a:gridCol>
+                    <a:gridCol w="1511085">
+                      <a:extLst>
+                        <a:ext uri="{9D8B030D-6E8A-4147-A177-3AD203B41FA5}">
+                          <a16:colId xmlns:a16="http://schemas.microsoft.com/office/drawing/2014/main" val="2064641327"/>
+                        </a:ext>
+                      </a:extLst>
+                    </a:gridCol>
+                    <a:gridCol w="2399654">
+                      <a:extLst>
+                        <a:ext uri="{9D8B030D-6E8A-4147-A177-3AD203B41FA5}">
+                          <a16:colId xmlns:a16="http://schemas.microsoft.com/office/drawing/2014/main" val="3570533111"/>
+                        </a:ext>
+                      </a:extLst>
+                    </a:gridCol>
+                  </a:tblGrid>
+                  <a:tr h="279785">
+                    <a:tc>
+                      <a:txBody>
+                        <a:bodyPr/>
+                        <a:lstStyle/>
+                        <a:p>
+                          <a:r>
+                            <a:rPr lang="ru-RU" dirty="0"/>
+                            <a:t>Коэффициент</a:t>
+                          </a:r>
+                          <a:endParaRPr lang="fr-CH" dirty="0"/>
+                        </a:p>
+                      </a:txBody>
+                      <a:tcPr/>
+                    </a:tc>
+                    <a:tc>
+                      <a:txBody>
+                        <a:bodyPr/>
+                        <a:lstStyle/>
+                        <a:p>
+                          <a:r>
+                            <a:rPr lang="ru-RU" dirty="0"/>
+                            <a:t>Размерность</a:t>
+                          </a:r>
+                          <a:endParaRPr lang="fr-CH" dirty="0"/>
+                        </a:p>
+                      </a:txBody>
+                      <a:tcPr/>
+                    </a:tc>
+                    <a:tc>
+                      <a:txBody>
+                        <a:bodyPr/>
+                        <a:lstStyle/>
+                        <a:p>
+                          <a:r>
+                            <a:rPr lang="ru-RU" dirty="0"/>
+                            <a:t>Описание</a:t>
+                          </a:r>
+                          <a:endParaRPr lang="fr-CH" dirty="0"/>
+                        </a:p>
+                      </a:txBody>
+                      <a:tcPr/>
+                    </a:tc>
+                    <a:extLst>
+                      <a:ext uri="{0D108BD9-81ED-4DB2-BD59-A6C34878D82A}">
+                        <a16:rowId xmlns:a16="http://schemas.microsoft.com/office/drawing/2014/main" val="3609856121"/>
+                      </a:ext>
+                    </a:extLst>
+                  </a:tr>
+                  <a:tr h="279785">
+                    <a:tc>
+                      <a:txBody>
+                        <a:bodyPr/>
+                        <a:lstStyle/>
+                        <a:p>
+                          <a:pPr/>
+                          <a14:m>
+                            <m:oMathPara xmlns:m="http://schemas.openxmlformats.org/officeDocument/2006/math">
+                              <m:oMathParaPr>
+                                <m:jc m:val="centerGroup"/>
+                              </m:oMathParaPr>
+                              <m:oMath xmlns:m="http://schemas.openxmlformats.org/officeDocument/2006/math">
+                                <m:r>
+                                  <a:rPr lang="en-US" b="0" i="1" smtClean="0">
+                                    <a:latin typeface="Cambria Math" panose="02040503050406030204" pitchFamily="18" charset="0"/>
+                                  </a:rPr>
+                                  <m:t>𝜌</m:t>
+                                </m:r>
+                              </m:oMath>
+                            </m:oMathPara>
+                          </a14:m>
+                          <a:endParaRPr lang="fr-CH" dirty="0"/>
+                        </a:p>
+                      </a:txBody>
+                      <a:tcPr/>
+                    </a:tc>
+                    <a:tc>
+                      <a:txBody>
+                        <a:bodyPr/>
+                        <a:lstStyle/>
+                        <a:p>
+                          <a:pPr/>
+                          <a14:m>
+                            <m:oMathPara xmlns:m="http://schemas.openxmlformats.org/officeDocument/2006/math">
+                              <m:oMathParaPr>
+                                <m:jc m:val="centerGroup"/>
+                              </m:oMathParaPr>
+                              <m:oMath xmlns:m="http://schemas.openxmlformats.org/officeDocument/2006/math">
+                                <m:r>
+                                  <a:rPr lang="en-US" b="0" i="1" smtClean="0">
+                                    <a:latin typeface="Cambria Math" panose="02040503050406030204" pitchFamily="18" charset="0"/>
+                                  </a:rPr>
+                                  <m:t>𝑘𝑔</m:t>
+                                </m:r>
+                                <m:r>
+                                  <a:rPr lang="en-US" b="0" i="1" smtClean="0">
+                                    <a:latin typeface="Cambria Math" panose="02040503050406030204" pitchFamily="18" charset="0"/>
+                                  </a:rPr>
+                                  <m:t>/</m:t>
+                                </m:r>
+                                <m:sSup>
+                                  <m:sSupPr>
+                                    <m:ctrlPr>
+                                      <a:rPr lang="en-US" b="0" i="1" smtClean="0">
+                                        <a:latin typeface="Cambria Math" panose="02040503050406030204" pitchFamily="18" charset="0"/>
+                                      </a:rPr>
+                                    </m:ctrlPr>
+                                  </m:sSupPr>
+                                  <m:e>
+                                    <m:r>
+                                      <a:rPr lang="en-US" b="0" i="1" smtClean="0">
+                                        <a:latin typeface="Cambria Math" panose="02040503050406030204" pitchFamily="18" charset="0"/>
+                                      </a:rPr>
+                                      <m:t>𝑚</m:t>
+                                    </m:r>
+                                  </m:e>
+                                  <m:sup>
+                                    <m:r>
+                                      <a:rPr lang="en-US" b="0" i="1" smtClean="0">
+                                        <a:latin typeface="Cambria Math" panose="02040503050406030204" pitchFamily="18" charset="0"/>
+                                      </a:rPr>
+                                      <m:t>3</m:t>
+                                    </m:r>
+                                  </m:sup>
+                                </m:sSup>
+                              </m:oMath>
+                            </m:oMathPara>
+                          </a14:m>
+                          <a:endParaRPr lang="fr-CH" dirty="0"/>
+                        </a:p>
+                      </a:txBody>
+                      <a:tcPr/>
+                    </a:tc>
+                    <a:tc>
+                      <a:txBody>
+                        <a:bodyPr/>
+                        <a:lstStyle/>
+                        <a:p>
+                          <a:r>
+                            <a:rPr lang="ru-RU" dirty="0"/>
+                            <a:t>Плотность стержня</a:t>
+                          </a:r>
+                          <a:endParaRPr lang="fr-CH" dirty="0"/>
+                        </a:p>
+                      </a:txBody>
+                      <a:tcPr/>
+                    </a:tc>
+                    <a:extLst>
+                      <a:ext uri="{0D108BD9-81ED-4DB2-BD59-A6C34878D82A}">
+                        <a16:rowId xmlns:a16="http://schemas.microsoft.com/office/drawing/2014/main" val="1772322357"/>
+                      </a:ext>
+                    </a:extLst>
+                  </a:tr>
+                  <a:tr h="489624">
+                    <a:tc>
+                      <a:txBody>
+                        <a:bodyPr/>
+                        <a:lstStyle/>
+                        <a:p>
+                          <a:pPr/>
+                          <a14:m>
+                            <m:oMathPara xmlns:m="http://schemas.openxmlformats.org/officeDocument/2006/math">
+                              <m:oMathParaPr>
+                                <m:jc m:val="centerGroup"/>
+                              </m:oMathParaPr>
+                              <m:oMath xmlns:m="http://schemas.openxmlformats.org/officeDocument/2006/math">
+                                <m:r>
+                                  <a:rPr lang="en-US" b="0" i="1" smtClean="0">
+                                    <a:latin typeface="Cambria Math" panose="02040503050406030204" pitchFamily="18" charset="0"/>
+                                  </a:rPr>
+                                  <m:t>𝑅</m:t>
+                                </m:r>
+                              </m:oMath>
+                            </m:oMathPara>
+                          </a14:m>
+                          <a:endParaRPr lang="fr-CH" dirty="0"/>
+                        </a:p>
+                      </a:txBody>
+                      <a:tcPr/>
+                    </a:tc>
+                    <a:tc>
+                      <a:txBody>
+                        <a:bodyPr/>
+                        <a:lstStyle/>
+                        <a:p>
+                          <a:pPr/>
+                          <a14:m>
+                            <m:oMathPara xmlns:m="http://schemas.openxmlformats.org/officeDocument/2006/math">
+                              <m:oMathParaPr>
+                                <m:jc m:val="centerGroup"/>
+                              </m:oMathParaPr>
+                              <m:oMath xmlns:m="http://schemas.openxmlformats.org/officeDocument/2006/math">
+                                <m:r>
+                                  <a:rPr lang="en-US" b="0" i="1" smtClean="0">
+                                    <a:latin typeface="Cambria Math" panose="02040503050406030204" pitchFamily="18" charset="0"/>
+                                  </a:rPr>
+                                  <m:t>𝑚</m:t>
+                                </m:r>
+                              </m:oMath>
+                            </m:oMathPara>
+                          </a14:m>
+                          <a:endParaRPr lang="fr-CH" dirty="0"/>
+                        </a:p>
+                      </a:txBody>
+                      <a:tcPr/>
+                    </a:tc>
+                    <a:tc>
+                      <a:txBody>
+                        <a:bodyPr/>
+                        <a:lstStyle/>
+                        <a:p>
+                          <a:r>
+                            <a:rPr lang="ru-RU" dirty="0"/>
+                            <a:t>Радиус сечения</a:t>
+                          </a:r>
+                          <a:endParaRPr lang="fr-CH" dirty="0"/>
+                        </a:p>
+                      </a:txBody>
+                      <a:tcPr/>
+                    </a:tc>
+                    <a:extLst>
+                      <a:ext uri="{0D108BD9-81ED-4DB2-BD59-A6C34878D82A}">
+                        <a16:rowId xmlns:a16="http://schemas.microsoft.com/office/drawing/2014/main" val="284929364"/>
+                      </a:ext>
+                    </a:extLst>
+                  </a:tr>
+                  <a:tr h="279785">
+                    <a:tc>
+                      <a:txBody>
+                        <a:bodyPr/>
+                        <a:lstStyle/>
+                        <a:p>
+                          <a:pPr/>
+                          <a14:m>
+                            <m:oMathPara xmlns:m="http://schemas.openxmlformats.org/officeDocument/2006/math">
+                              <m:oMathParaPr>
+                                <m:jc m:val="centerGroup"/>
+                              </m:oMathParaPr>
+                              <m:oMath xmlns:m="http://schemas.openxmlformats.org/officeDocument/2006/math">
+                                <m:r>
+                                  <a:rPr lang="en-US" b="0" i="1" smtClean="0">
+                                    <a:latin typeface="Cambria Math" panose="02040503050406030204" pitchFamily="18" charset="0"/>
+                                  </a:rPr>
+                                  <m:t>𝐸</m:t>
+                                </m:r>
+                              </m:oMath>
+                            </m:oMathPara>
+                          </a14:m>
+                          <a:endParaRPr lang="fr-CH" dirty="0"/>
+                        </a:p>
+                      </a:txBody>
+                      <a:tcPr/>
+                    </a:tc>
+                    <a:tc>
+                      <a:txBody>
+                        <a:bodyPr/>
+                        <a:lstStyle/>
+                        <a:p>
+                          <a:pPr/>
+                          <a14:m>
+                            <m:oMathPara xmlns:m="http://schemas.openxmlformats.org/officeDocument/2006/math">
+                              <m:oMathParaPr>
+                                <m:jc m:val="centerGroup"/>
+                              </m:oMathParaPr>
+                              <m:oMath xmlns:m="http://schemas.openxmlformats.org/officeDocument/2006/math">
+                                <m:r>
+                                  <a:rPr lang="en-US" b="0" i="1" smtClean="0">
+                                    <a:latin typeface="Cambria Math" panose="02040503050406030204" pitchFamily="18" charset="0"/>
+                                  </a:rPr>
+                                  <m:t>𝑘𝑔</m:t>
+                                </m:r>
+                                <m:r>
+                                  <a:rPr lang="en-US" b="0" i="1" smtClean="0">
+                                    <a:latin typeface="Cambria Math" panose="02040503050406030204" pitchFamily="18" charset="0"/>
+                                  </a:rPr>
+                                  <m:t>/(</m:t>
+                                </m:r>
+                                <m:r>
+                                  <a:rPr lang="en-US" b="0" i="1" smtClean="0">
+                                    <a:latin typeface="Cambria Math" panose="02040503050406030204" pitchFamily="18" charset="0"/>
+                                  </a:rPr>
+                                  <m:t>𝑚</m:t>
+                                </m:r>
+                                <m:r>
+                                  <a:rPr lang="en-US" b="0" i="1" smtClean="0">
+                                    <a:latin typeface="Cambria Math" panose="02040503050406030204" pitchFamily="18" charset="0"/>
+                                  </a:rPr>
+                                  <m:t>⋅</m:t>
+                                </m:r>
+                                <m:r>
+                                  <a:rPr lang="en-US" b="0" i="1" smtClean="0">
+                                    <a:latin typeface="Cambria Math" panose="02040503050406030204" pitchFamily="18" charset="0"/>
+                                  </a:rPr>
+                                  <m:t>𝑠</m:t>
+                                </m:r>
+                                <m:r>
+                                  <a:rPr lang="en-US" b="0" i="1" smtClean="0">
+                                    <a:latin typeface="Cambria Math" panose="02040503050406030204" pitchFamily="18" charset="0"/>
+                                  </a:rPr>
+                                  <m:t>)</m:t>
+                                </m:r>
+                              </m:oMath>
+                            </m:oMathPara>
+                          </a14:m>
+                          <a:endParaRPr lang="fr-CH" dirty="0"/>
+                        </a:p>
+                      </a:txBody>
+                      <a:tcPr/>
+                    </a:tc>
+                    <a:tc>
+                      <a:txBody>
+                        <a:bodyPr/>
+                        <a:lstStyle/>
+                        <a:p>
+                          <a:r>
+                            <a:rPr lang="ru-RU" dirty="0"/>
+                            <a:t>Модуль Юнга</a:t>
+                          </a:r>
+                          <a:endParaRPr lang="fr-CH" dirty="0"/>
+                        </a:p>
+                      </a:txBody>
+                      <a:tcPr/>
+                    </a:tc>
+                    <a:extLst>
+                      <a:ext uri="{0D108BD9-81ED-4DB2-BD59-A6C34878D82A}">
+                        <a16:rowId xmlns:a16="http://schemas.microsoft.com/office/drawing/2014/main" val="1576472783"/>
+                      </a:ext>
+                    </a:extLst>
+                  </a:tr>
+                </a:tbl>
+              </a:graphicData>
+            </a:graphic>
+          </p:graphicFrame>
+        </mc:Choice>
+        <mc:Fallback xmlns="">
+          <p:graphicFrame>
+            <p:nvGraphicFramePr>
+              <p:cNvPr id="8" name="Table 8">
+                <a:extLst>
+                  <a:ext uri="{FF2B5EF4-FFF2-40B4-BE49-F238E27FC236}">
+                    <a16:creationId xmlns:a16="http://schemas.microsoft.com/office/drawing/2014/main" id="{2C6F59B2-DCEE-4659-B6E3-12BAF222332E}"/>
+                  </a:ext>
+                </a:extLst>
+              </p:cNvPr>
+              <p:cNvGraphicFramePr>
+                <a:graphicFrameLocks noGrp="1"/>
+              </p:cNvGraphicFramePr>
+              <p:nvPr>
+                <p:extLst>
+                  <p:ext uri="{D42A27DB-BD31-4B8C-83A1-F6EECF244321}">
+                    <p14:modId xmlns:p14="http://schemas.microsoft.com/office/powerpoint/2010/main" val="1239617158"/>
+                  </p:ext>
+                </p:extLst>
+              </p:nvPr>
+            </p:nvGraphicFramePr>
+            <p:xfrm>
+              <a:off x="564196" y="4185993"/>
+              <a:ext cx="5492882" cy="1586904"/>
+            </p:xfrm>
+            <a:graphic>
+              <a:graphicData uri="http://schemas.openxmlformats.org/drawingml/2006/table">
+                <a:tbl>
+                  <a:tblPr firstRow="1" bandRow="1">
+                    <a:tableStyleId>{5C22544A-7EE6-4342-B048-85BDC9FD1C3A}</a:tableStyleId>
+                  </a:tblPr>
+                  <a:tblGrid>
+                    <a:gridCol w="1582143">
+                      <a:extLst>
+                        <a:ext uri="{9D8B030D-6E8A-4147-A177-3AD203B41FA5}">
+                          <a16:colId xmlns:a16="http://schemas.microsoft.com/office/drawing/2014/main" val="219512031"/>
+                        </a:ext>
+                      </a:extLst>
+                    </a:gridCol>
+                    <a:gridCol w="1511085">
+                      <a:extLst>
+                        <a:ext uri="{9D8B030D-6E8A-4147-A177-3AD203B41FA5}">
+                          <a16:colId xmlns:a16="http://schemas.microsoft.com/office/drawing/2014/main" val="2064641327"/>
+                        </a:ext>
+                      </a:extLst>
+                    </a:gridCol>
+                    <a:gridCol w="2399654">
+                      <a:extLst>
+                        <a:ext uri="{9D8B030D-6E8A-4147-A177-3AD203B41FA5}">
+                          <a16:colId xmlns:a16="http://schemas.microsoft.com/office/drawing/2014/main" val="3570533111"/>
+                        </a:ext>
+                      </a:extLst>
+                    </a:gridCol>
+                  </a:tblGrid>
+                  <a:tr h="365760">
+                    <a:tc>
+                      <a:txBody>
+                        <a:bodyPr/>
+                        <a:lstStyle/>
+                        <a:p>
+                          <a:r>
+                            <a:rPr lang="ru-RU" dirty="0"/>
+                            <a:t>Коэффициент</a:t>
+                          </a:r>
+                          <a:endParaRPr lang="fr-CH" dirty="0"/>
+                        </a:p>
+                      </a:txBody>
+                      <a:tcPr/>
+                    </a:tc>
+                    <a:tc>
+                      <a:txBody>
+                        <a:bodyPr/>
+                        <a:lstStyle/>
+                        <a:p>
+                          <a:r>
+                            <a:rPr lang="ru-RU" dirty="0"/>
+                            <a:t>Размерность</a:t>
+                          </a:r>
+                          <a:endParaRPr lang="fr-CH" dirty="0"/>
+                        </a:p>
+                      </a:txBody>
+                      <a:tcPr/>
+                    </a:tc>
+                    <a:tc>
+                      <a:txBody>
+                        <a:bodyPr/>
+                        <a:lstStyle/>
+                        <a:p>
+                          <a:r>
+                            <a:rPr lang="ru-RU" dirty="0"/>
+                            <a:t>Описание</a:t>
+                          </a:r>
+                          <a:endParaRPr lang="fr-CH" dirty="0"/>
+                        </a:p>
+                      </a:txBody>
+                      <a:tcPr/>
+                    </a:tc>
+                    <a:extLst>
+                      <a:ext uri="{0D108BD9-81ED-4DB2-BD59-A6C34878D82A}">
+                        <a16:rowId xmlns:a16="http://schemas.microsoft.com/office/drawing/2014/main" val="3609856121"/>
+                      </a:ext>
+                    </a:extLst>
+                  </a:tr>
+                  <a:tr h="365760">
+                    <a:tc>
+                      <a:txBody>
+                        <a:bodyPr/>
+                        <a:lstStyle/>
+                        <a:p>
+                          <a:endParaRPr lang="fr-FR"/>
+                        </a:p>
+                      </a:txBody>
+                      <a:tcPr>
+                        <a:blipFill>
+                          <a:blip r:embed="rId3"/>
+                          <a:stretch>
+                            <a:fillRect l="-385" t="-108333" r="-248462" b="-261667"/>
+                          </a:stretch>
+                        </a:blipFill>
+                      </a:tcPr>
+                    </a:tc>
+                    <a:tc>
+                      <a:txBody>
+                        <a:bodyPr/>
+                        <a:lstStyle/>
+                        <a:p>
+                          <a:endParaRPr lang="fr-FR"/>
+                        </a:p>
+                      </a:txBody>
+                      <a:tcPr>
+                        <a:blipFill>
+                          <a:blip r:embed="rId3"/>
+                          <a:stretch>
+                            <a:fillRect l="-105242" t="-108333" r="-160484" b="-261667"/>
+                          </a:stretch>
+                        </a:blipFill>
+                      </a:tcPr>
+                    </a:tc>
+                    <a:tc>
+                      <a:txBody>
+                        <a:bodyPr/>
+                        <a:lstStyle/>
+                        <a:p>
+                          <a:r>
+                            <a:rPr lang="ru-RU" dirty="0"/>
+                            <a:t>Плотность стержня</a:t>
+                          </a:r>
+                          <a:endParaRPr lang="fr-CH" dirty="0"/>
+                        </a:p>
+                      </a:txBody>
+                      <a:tcPr/>
+                    </a:tc>
+                    <a:extLst>
+                      <a:ext uri="{0D108BD9-81ED-4DB2-BD59-A6C34878D82A}">
+                        <a16:rowId xmlns:a16="http://schemas.microsoft.com/office/drawing/2014/main" val="1772322357"/>
+                      </a:ext>
+                    </a:extLst>
+                  </a:tr>
+                  <a:tr h="489624">
+                    <a:tc>
+                      <a:txBody>
+                        <a:bodyPr/>
+                        <a:lstStyle/>
+                        <a:p>
+                          <a:endParaRPr lang="fr-FR"/>
+                        </a:p>
+                      </a:txBody>
+                      <a:tcPr>
+                        <a:blipFill>
+                          <a:blip r:embed="rId3"/>
+                          <a:stretch>
+                            <a:fillRect l="-385" t="-154321" r="-248462" b="-93827"/>
+                          </a:stretch>
+                        </a:blipFill>
+                      </a:tcPr>
+                    </a:tc>
+                    <a:tc>
+                      <a:txBody>
+                        <a:bodyPr/>
+                        <a:lstStyle/>
+                        <a:p>
+                          <a:endParaRPr lang="fr-FR"/>
+                        </a:p>
+                      </a:txBody>
+                      <a:tcPr>
+                        <a:blipFill>
+                          <a:blip r:embed="rId3"/>
+                          <a:stretch>
+                            <a:fillRect l="-105242" t="-154321" r="-160484" b="-93827"/>
+                          </a:stretch>
+                        </a:blipFill>
+                      </a:tcPr>
+                    </a:tc>
+                    <a:tc>
+                      <a:txBody>
+                        <a:bodyPr/>
+                        <a:lstStyle/>
+                        <a:p>
+                          <a:r>
+                            <a:rPr lang="ru-RU" dirty="0"/>
+                            <a:t>Радиус сечения</a:t>
+                          </a:r>
+                          <a:endParaRPr lang="fr-CH" dirty="0"/>
+                        </a:p>
+                      </a:txBody>
+                      <a:tcPr/>
+                    </a:tc>
+                    <a:extLst>
+                      <a:ext uri="{0D108BD9-81ED-4DB2-BD59-A6C34878D82A}">
+                        <a16:rowId xmlns:a16="http://schemas.microsoft.com/office/drawing/2014/main" val="284929364"/>
+                      </a:ext>
+                    </a:extLst>
+                  </a:tr>
+                  <a:tr h="365760">
+                    <a:tc>
+                      <a:txBody>
+                        <a:bodyPr/>
+                        <a:lstStyle/>
+                        <a:p>
+                          <a:endParaRPr lang="fr-FR"/>
+                        </a:p>
+                      </a:txBody>
+                      <a:tcPr>
+                        <a:blipFill>
+                          <a:blip r:embed="rId3"/>
+                          <a:stretch>
+                            <a:fillRect l="-385" t="-343333" r="-248462" b="-26667"/>
+                          </a:stretch>
+                        </a:blipFill>
+                      </a:tcPr>
+                    </a:tc>
+                    <a:tc>
+                      <a:txBody>
+                        <a:bodyPr/>
+                        <a:lstStyle/>
+                        <a:p>
+                          <a:endParaRPr lang="fr-FR"/>
+                        </a:p>
+                      </a:txBody>
+                      <a:tcPr>
+                        <a:blipFill>
+                          <a:blip r:embed="rId3"/>
+                          <a:stretch>
+                            <a:fillRect l="-105242" t="-343333" r="-160484" b="-26667"/>
+                          </a:stretch>
+                        </a:blipFill>
+                      </a:tcPr>
+                    </a:tc>
+                    <a:tc>
+                      <a:txBody>
+                        <a:bodyPr/>
+                        <a:lstStyle/>
+                        <a:p>
+                          <a:r>
+                            <a:rPr lang="ru-RU" dirty="0"/>
+                            <a:t>Модуль Юнга</a:t>
+                          </a:r>
+                          <a:endParaRPr lang="fr-CH" dirty="0"/>
+                        </a:p>
+                      </a:txBody>
+                      <a:tcPr/>
+                    </a:tc>
+                    <a:extLst>
+                      <a:ext uri="{0D108BD9-81ED-4DB2-BD59-A6C34878D82A}">
+                        <a16:rowId xmlns:a16="http://schemas.microsoft.com/office/drawing/2014/main" val="1576472783"/>
+                      </a:ext>
+                    </a:extLst>
+                  </a:tr>
+                </a:tbl>
+              </a:graphicData>
+            </a:graphic>
+          </p:graphicFrame>
+        </mc:Fallback>
+      </mc:AlternateContent>
+    </p:spTree>
+    <p:extLst>
+      <p:ext uri="{BB962C8B-B14F-4D97-AF65-F5344CB8AC3E}">
+        <p14:creationId xmlns:p14="http://schemas.microsoft.com/office/powerpoint/2010/main" val="843577549"/>
+      </p:ext>
+    </p:extLst>
+  </p:cSld>
+  <p:clrMapOvr>
+    <a:masterClrMapping/>
+  </p:clrMapOvr>
+</p:sld>
+</file>
+
+<file path=ppt/slides/slide3.xml><?xml version="1.0" encoding="utf-8"?>
+<p:sld xmlns:a="http://schemas.openxmlformats.org/drawingml/2006/main" xmlns:r="http://schemas.openxmlformats.org/officeDocument/2006/relationships" xmlns:p="http://schemas.openxmlformats.org/presentationml/2006/main">
+  <p:cSld>
+    <p:spTree>
+      <p:nvGrpSpPr>
+        <p:cNvPr id="1" name=""/>
+        <p:cNvGrpSpPr/>
+        <p:nvPr/>
+      </p:nvGrpSpPr>
+      <p:grpSpPr>
+        <a:xfrm>
+          <a:off x="0" y="0"/>
+          <a:ext cx="0" cy="0"/>
+          <a:chOff x="0" y="0"/>
+          <a:chExt cx="0" cy="0"/>
+        </a:xfrm>
+      </p:grpSpPr>
+      <p:sp>
+        <p:nvSpPr>
+          <p:cNvPr id="3" name="Заголовок 2">
+            <a:extLst>
+              <a:ext uri="{FF2B5EF4-FFF2-40B4-BE49-F238E27FC236}">
+                <a16:creationId xmlns:a16="http://schemas.microsoft.com/office/drawing/2014/main" id="{E2EAF03B-EC26-1D47-94AC-C75942861D6C}"/>
+              </a:ext>
+            </a:extLst>
+          </p:cNvPr>
+          <p:cNvSpPr>
+            <a:spLocks noGrp="1"/>
+          </p:cNvSpPr>
+          <p:nvPr>
+            <p:ph type="title"/>
+          </p:nvPr>
+        </p:nvSpPr>
+        <p:spPr/>
+        <p:txBody>
+          <a:bodyPr/>
+          <a:lstStyle/>
+          <a:p>
+            <a:r>
+              <a:rPr lang="ru-RU" dirty="0"/>
+              <a:t>Схема Кранка – Николсон</a:t>
+            </a:r>
+          </a:p>
+        </p:txBody>
+      </p:sp>
+      <mc:AlternateContent xmlns:mc="http://schemas.openxmlformats.org/markup-compatibility/2006" xmlns:a14="http://schemas.microsoft.com/office/drawing/2010/main">
+        <mc:Choice Requires="a14">
+          <p:sp>
+            <p:nvSpPr>
+              <p:cNvPr id="4" name="Текст 3">
+                <a:extLst>
+                  <a:ext uri="{FF2B5EF4-FFF2-40B4-BE49-F238E27FC236}">
+                    <a16:creationId xmlns:a16="http://schemas.microsoft.com/office/drawing/2014/main" id="{53356540-7218-FF4B-B6BC-5BD291A372E2}"/>
+                  </a:ext>
+                </a:extLst>
+              </p:cNvPr>
+              <p:cNvSpPr>
+                <a:spLocks noGrp="1"/>
+              </p:cNvSpPr>
+              <p:nvPr>
+                <p:ph type="body" sz="quarter" idx="12"/>
+              </p:nvPr>
+            </p:nvSpPr>
+            <p:spPr/>
+            <p:txBody>
+              <a:bodyPr>
+                <a:normAutofit/>
+              </a:bodyPr>
+              <a:lstStyle/>
+              <a:p>
+                <a:r>
+                  <a:rPr lang="ru-RU" dirty="0"/>
+                  <a:t>Уравнение</a:t>
+                </a:r>
+              </a:p>
+              <a:p>
+                <a:pPr/>
+                <a14:m>
+                  <m:oMathPara xmlns:m="http://schemas.openxmlformats.org/officeDocument/2006/math">
+                    <m:oMathParaPr>
+                      <m:jc m:val="centerGroup"/>
+                    </m:oMathParaPr>
+                    <m:oMath xmlns:m="http://schemas.openxmlformats.org/officeDocument/2006/math">
+                      <m:r>
+                        <a:rPr lang="en-US" b="0" i="1" smtClean="0">
+                          <a:latin typeface="Cambria Math" panose="02040503050406030204" pitchFamily="18" charset="0"/>
+                        </a:rPr>
+                        <m:t>𝜌</m:t>
+                      </m:r>
+                      <m:sSubSup>
+                        <m:sSubSupPr>
+                          <m:ctrlPr>
+                            <a:rPr lang="en-US" b="0" i="1" smtClean="0">
+                              <a:latin typeface="Cambria Math" panose="02040503050406030204" pitchFamily="18" charset="0"/>
+                            </a:rPr>
+                          </m:ctrlPr>
+                        </m:sSubSupPr>
+                        <m:e>
+                          <m:r>
+                            <a:rPr lang="en-US" b="0" i="1" smtClean="0">
+                              <a:latin typeface="Cambria Math" panose="02040503050406030204" pitchFamily="18" charset="0"/>
+                            </a:rPr>
+                            <m:t>𝜕</m:t>
+                          </m:r>
+                        </m:e>
+                        <m:sub>
+                          <m:r>
+                            <a:rPr lang="en-US" b="0" i="1" smtClean="0">
+                              <a:latin typeface="Cambria Math" panose="02040503050406030204" pitchFamily="18" charset="0"/>
+                            </a:rPr>
+                            <m:t>𝑡</m:t>
+                          </m:r>
+                        </m:sub>
+                        <m:sup>
+                          <m:r>
+                            <a:rPr lang="en-US" b="0" i="1" smtClean="0">
+                              <a:latin typeface="Cambria Math" panose="02040503050406030204" pitchFamily="18" charset="0"/>
+                            </a:rPr>
+                            <m:t>2</m:t>
+                          </m:r>
+                        </m:sup>
+                      </m:sSubSup>
+                      <m:r>
+                        <a:rPr lang="en-US" b="0" i="1" smtClean="0">
+                          <a:latin typeface="Cambria Math" panose="02040503050406030204" pitchFamily="18" charset="0"/>
+                        </a:rPr>
+                        <m:t>𝑢</m:t>
+                      </m:r>
+                      <m:r>
+                        <a:rPr lang="en-US" b="0" i="1" smtClean="0">
+                          <a:latin typeface="Cambria Math" panose="02040503050406030204" pitchFamily="18" charset="0"/>
+                        </a:rPr>
+                        <m:t>−</m:t>
+                      </m:r>
+                      <m:sSup>
+                        <m:sSupPr>
+                          <m:ctrlPr>
+                            <a:rPr lang="en-US" b="0" i="1" smtClean="0">
+                              <a:latin typeface="Cambria Math" panose="02040503050406030204" pitchFamily="18" charset="0"/>
+                            </a:rPr>
+                          </m:ctrlPr>
+                        </m:sSupPr>
+                        <m:e>
+                          <m:r>
+                            <a:rPr lang="en-US" b="0" i="1" smtClean="0">
+                              <a:latin typeface="Cambria Math" panose="02040503050406030204" pitchFamily="18" charset="0"/>
+                            </a:rPr>
+                            <m:t>𝑅</m:t>
+                          </m:r>
+                        </m:e>
+                        <m:sup>
+                          <m:r>
+                            <a:rPr lang="en-US" b="0" i="1" smtClean="0">
+                              <a:latin typeface="Cambria Math" panose="02040503050406030204" pitchFamily="18" charset="0"/>
+                            </a:rPr>
+                            <m:t>2</m:t>
+                          </m:r>
+                        </m:sup>
+                      </m:sSup>
+                      <m:r>
+                        <a:rPr lang="en-US" b="0" i="1" smtClean="0">
+                          <a:latin typeface="Cambria Math" panose="02040503050406030204" pitchFamily="18" charset="0"/>
+                        </a:rPr>
+                        <m:t>𝜌</m:t>
+                      </m:r>
+                      <m:sSubSup>
+                        <m:sSubSupPr>
+                          <m:ctrlPr>
+                            <a:rPr lang="en-US" b="0" i="1" smtClean="0">
+                              <a:latin typeface="Cambria Math" panose="02040503050406030204" pitchFamily="18" charset="0"/>
+                            </a:rPr>
+                          </m:ctrlPr>
+                        </m:sSubSupPr>
+                        <m:e>
+                          <m:r>
+                            <a:rPr lang="en-US" i="1">
+                              <a:latin typeface="Cambria Math" panose="02040503050406030204" pitchFamily="18" charset="0"/>
+                            </a:rPr>
+                            <m:t>𝜕</m:t>
+                          </m:r>
+                        </m:e>
+                        <m:sub>
+                          <m:sSup>
+                            <m:sSupPr>
+                              <m:ctrlPr>
+                                <a:rPr lang="en-US" b="0" i="1" smtClean="0">
+                                  <a:latin typeface="Cambria Math" panose="02040503050406030204" pitchFamily="18" charset="0"/>
+                                </a:rPr>
+                              </m:ctrlPr>
+                            </m:sSupPr>
+                            <m:e>
+                              <m:r>
+                                <a:rPr lang="en-US" b="0" i="1" smtClean="0">
+                                  <a:latin typeface="Cambria Math" panose="02040503050406030204" pitchFamily="18" charset="0"/>
+                                </a:rPr>
+                                <m:t>𝑥</m:t>
+                              </m:r>
+                            </m:e>
+                            <m:sup>
+                              <m:r>
+                                <a:rPr lang="en-US" b="0" i="1" smtClean="0">
+                                  <a:latin typeface="Cambria Math" panose="02040503050406030204" pitchFamily="18" charset="0"/>
+                                </a:rPr>
+                                <m:t>2</m:t>
+                              </m:r>
+                            </m:sup>
+                          </m:sSup>
+                          <m:sSup>
+                            <m:sSupPr>
+                              <m:ctrlPr>
+                                <a:rPr lang="en-US" b="0" i="1" smtClean="0">
+                                  <a:latin typeface="Cambria Math" panose="02040503050406030204" pitchFamily="18" charset="0"/>
+                                </a:rPr>
+                              </m:ctrlPr>
+                            </m:sSupPr>
+                            <m:e>
+                              <m:r>
+                                <a:rPr lang="en-US" b="0" i="1" smtClean="0">
+                                  <a:latin typeface="Cambria Math" panose="02040503050406030204" pitchFamily="18" charset="0"/>
+                                </a:rPr>
+                                <m:t>𝑡</m:t>
+                              </m:r>
+                            </m:e>
+                            <m:sup>
+                              <m:r>
+                                <a:rPr lang="en-US" b="0" i="1" smtClean="0">
+                                  <a:latin typeface="Cambria Math" panose="02040503050406030204" pitchFamily="18" charset="0"/>
+                                </a:rPr>
+                                <m:t>2</m:t>
+                              </m:r>
+                            </m:sup>
+                          </m:sSup>
+                        </m:sub>
+                        <m:sup>
+                          <m:r>
+                            <a:rPr lang="en-US" i="1">
+                              <a:latin typeface="Cambria Math" panose="02040503050406030204" pitchFamily="18" charset="0"/>
+                            </a:rPr>
+                            <m:t>4</m:t>
+                          </m:r>
+                        </m:sup>
+                      </m:sSubSup>
+                      <m:r>
+                        <a:rPr lang="en-US" b="0" i="1" smtClean="0">
+                          <a:latin typeface="Cambria Math" panose="02040503050406030204" pitchFamily="18" charset="0"/>
+                        </a:rPr>
+                        <m:t>𝑢</m:t>
+                      </m:r>
+                      <m:r>
+                        <a:rPr lang="en-US" b="0" i="1" smtClean="0">
+                          <a:latin typeface="Cambria Math" panose="02040503050406030204" pitchFamily="18" charset="0"/>
+                        </a:rPr>
+                        <m:t>+</m:t>
+                      </m:r>
+                      <m:r>
+                        <a:rPr lang="en-US" b="0" i="1" smtClean="0">
+                          <a:latin typeface="Cambria Math" panose="02040503050406030204" pitchFamily="18" charset="0"/>
+                        </a:rPr>
+                        <m:t>𝐸</m:t>
+                      </m:r>
+                      <m:sSup>
+                        <m:sSupPr>
+                          <m:ctrlPr>
+                            <a:rPr lang="en-US" b="0" i="1" smtClean="0">
+                              <a:latin typeface="Cambria Math" panose="02040503050406030204" pitchFamily="18" charset="0"/>
+                            </a:rPr>
+                          </m:ctrlPr>
+                        </m:sSupPr>
+                        <m:e>
+                          <m:r>
+                            <a:rPr lang="en-US" b="0" i="1" smtClean="0">
+                              <a:latin typeface="Cambria Math" panose="02040503050406030204" pitchFamily="18" charset="0"/>
+                            </a:rPr>
+                            <m:t>𝑅</m:t>
+                          </m:r>
+                        </m:e>
+                        <m:sup>
+                          <m:r>
+                            <a:rPr lang="en-US" b="0" i="1" smtClean="0">
+                              <a:latin typeface="Cambria Math" panose="02040503050406030204" pitchFamily="18" charset="0"/>
+                            </a:rPr>
+                            <m:t>2</m:t>
+                          </m:r>
+                        </m:sup>
+                      </m:sSup>
+                      <m:sSubSup>
+                        <m:sSubSupPr>
+                          <m:ctrlPr>
+                            <a:rPr lang="en-US" b="0" i="1" smtClean="0">
+                              <a:latin typeface="Cambria Math" panose="02040503050406030204" pitchFamily="18" charset="0"/>
+                            </a:rPr>
+                          </m:ctrlPr>
+                        </m:sSubSupPr>
+                        <m:e>
+                          <m:r>
+                            <a:rPr lang="en-US" b="0" i="1" smtClean="0">
+                              <a:latin typeface="Cambria Math" panose="02040503050406030204" pitchFamily="18" charset="0"/>
+                            </a:rPr>
+                            <m:t>𝜕</m:t>
+                          </m:r>
+                        </m:e>
+                        <m:sub>
+                          <m:r>
+                            <a:rPr lang="en-US" b="0" i="1" smtClean="0">
+                              <a:latin typeface="Cambria Math" panose="02040503050406030204" pitchFamily="18" charset="0"/>
+                            </a:rPr>
+                            <m:t>𝑥</m:t>
+                          </m:r>
+                        </m:sub>
+                        <m:sup>
+                          <m:r>
+                            <a:rPr lang="en-US" b="0" i="1" smtClean="0">
+                              <a:latin typeface="Cambria Math" panose="02040503050406030204" pitchFamily="18" charset="0"/>
+                            </a:rPr>
+                            <m:t>4</m:t>
+                          </m:r>
+                        </m:sup>
+                      </m:sSubSup>
+                      <m:r>
+                        <a:rPr lang="en-US" b="0" i="1" smtClean="0">
+                          <a:latin typeface="Cambria Math" panose="02040503050406030204" pitchFamily="18" charset="0"/>
+                        </a:rPr>
+                        <m:t>𝑢</m:t>
+                      </m:r>
+                      <m:r>
+                        <a:rPr lang="en-US" b="0" i="1" smtClean="0">
+                          <a:latin typeface="Cambria Math" panose="02040503050406030204" pitchFamily="18" charset="0"/>
+                        </a:rPr>
+                        <m:t>=</m:t>
+                      </m:r>
+                      <m:acc>
+                        <m:accPr>
+                          <m:chr m:val="̂"/>
+                          <m:ctrlPr>
+                            <a:rPr lang="en-US" b="0" i="1" smtClean="0">
+                              <a:latin typeface="Cambria Math" panose="02040503050406030204" pitchFamily="18" charset="0"/>
+                            </a:rPr>
+                          </m:ctrlPr>
+                        </m:accPr>
+                        <m:e>
+                          <m:r>
+                            <a:rPr lang="en-US" b="0" i="1" smtClean="0">
+                              <a:latin typeface="Cambria Math" panose="02040503050406030204" pitchFamily="18" charset="0"/>
+                            </a:rPr>
+                            <m:t>𝑓</m:t>
+                          </m:r>
+                        </m:e>
+                      </m:acc>
+                      <m:r>
+                        <a:rPr lang="en-US" b="0" i="1" smtClean="0">
+                          <a:latin typeface="Cambria Math" panose="02040503050406030204" pitchFamily="18" charset="0"/>
+                        </a:rPr>
+                        <m:t>(</m:t>
+                      </m:r>
+                      <m:r>
+                        <a:rPr lang="en-US" b="0" i="1" smtClean="0">
+                          <a:latin typeface="Cambria Math" panose="02040503050406030204" pitchFamily="18" charset="0"/>
+                        </a:rPr>
+                        <m:t>𝑡</m:t>
+                      </m:r>
+                      <m:r>
+                        <a:rPr lang="en-US" b="0" i="1" smtClean="0">
+                          <a:latin typeface="Cambria Math" panose="02040503050406030204" pitchFamily="18" charset="0"/>
+                        </a:rPr>
+                        <m:t>,</m:t>
+                      </m:r>
+                      <m:r>
+                        <a:rPr lang="en-US" b="0" i="1" smtClean="0">
+                          <a:latin typeface="Cambria Math" panose="02040503050406030204" pitchFamily="18" charset="0"/>
+                        </a:rPr>
+                        <m:t>𝑥</m:t>
+                      </m:r>
+                      <m:r>
+                        <a:rPr lang="en-US" b="0" i="1" smtClean="0">
+                          <a:latin typeface="Cambria Math" panose="02040503050406030204" pitchFamily="18" charset="0"/>
+                        </a:rPr>
+                        <m:t>)</m:t>
+                      </m:r>
+                    </m:oMath>
+                  </m:oMathPara>
+                </a14:m>
+                <a:endParaRPr lang="ru-RU" dirty="0"/>
+              </a:p>
+              <a:p>
+                <a:r>
+                  <a:rPr lang="ru-RU" dirty="0"/>
+                  <a:t>описывает динамику распространения поперечных колебаний стержня.</a:t>
+                </a:r>
+                <a:r>
+                  <a:rPr lang="en-US" dirty="0"/>
+                  <a:t> </a:t>
+                </a:r>
+                <a:r>
+                  <a:rPr lang="ru-RU" dirty="0"/>
+                  <a:t>Другой вид:</a:t>
+                </a:r>
+              </a:p>
+              <a:p>
+                <a:pPr/>
+                <a14:m>
+                  <m:oMathPara xmlns:m="http://schemas.openxmlformats.org/officeDocument/2006/math">
+                    <m:oMathParaPr>
+                      <m:jc m:val="centerGroup"/>
+                    </m:oMathParaPr>
+                    <m:oMath xmlns:m="http://schemas.openxmlformats.org/officeDocument/2006/math">
+                      <m:sSubSup>
+                        <m:sSubSupPr>
+                          <m:ctrlPr>
+                            <a:rPr lang="en-US" b="0" i="1" smtClean="0">
+                              <a:latin typeface="Cambria Math" panose="02040503050406030204" pitchFamily="18" charset="0"/>
+                            </a:rPr>
+                          </m:ctrlPr>
+                        </m:sSubSupPr>
+                        <m:e>
+                          <m:r>
+                            <a:rPr lang="en-US" b="0" i="1" smtClean="0">
+                              <a:latin typeface="Cambria Math" panose="02040503050406030204" pitchFamily="18" charset="0"/>
+                            </a:rPr>
+                            <m:t>𝜕</m:t>
+                          </m:r>
+                        </m:e>
+                        <m:sub>
+                          <m:r>
+                            <a:rPr lang="en-US" b="0" i="1" smtClean="0">
+                              <a:latin typeface="Cambria Math" panose="02040503050406030204" pitchFamily="18" charset="0"/>
+                            </a:rPr>
+                            <m:t>𝑡</m:t>
+                          </m:r>
+                        </m:sub>
+                        <m:sup>
+                          <m:r>
+                            <a:rPr lang="en-US" b="0" i="1" smtClean="0">
+                              <a:latin typeface="Cambria Math" panose="02040503050406030204" pitchFamily="18" charset="0"/>
+                            </a:rPr>
+                            <m:t>2</m:t>
+                          </m:r>
+                        </m:sup>
+                      </m:sSubSup>
+                      <m:r>
+                        <a:rPr lang="en-US" b="0" i="1" smtClean="0">
+                          <a:latin typeface="Cambria Math" panose="02040503050406030204" pitchFamily="18" charset="0"/>
+                        </a:rPr>
+                        <m:t>𝑢</m:t>
+                      </m:r>
+                      <m:r>
+                        <a:rPr lang="en-US" b="0" i="1" smtClean="0">
+                          <a:latin typeface="Cambria Math" panose="02040503050406030204" pitchFamily="18" charset="0"/>
+                        </a:rPr>
+                        <m:t>−</m:t>
+                      </m:r>
+                      <m:r>
+                        <a:rPr lang="en-US" b="0" i="1" smtClean="0">
+                          <a:latin typeface="Cambria Math" panose="02040503050406030204" pitchFamily="18" charset="0"/>
+                        </a:rPr>
+                        <m:t>𝐷</m:t>
+                      </m:r>
+                      <m:sSubSup>
+                        <m:sSubSupPr>
+                          <m:ctrlPr>
+                            <a:rPr lang="en-US" b="0" i="1" smtClean="0">
+                              <a:latin typeface="Cambria Math" panose="02040503050406030204" pitchFamily="18" charset="0"/>
+                            </a:rPr>
+                          </m:ctrlPr>
+                        </m:sSubSupPr>
+                        <m:e>
+                          <m:r>
+                            <a:rPr lang="en-US" i="1">
+                              <a:latin typeface="Cambria Math" panose="02040503050406030204" pitchFamily="18" charset="0"/>
+                            </a:rPr>
+                            <m:t>𝜕</m:t>
+                          </m:r>
+                        </m:e>
+                        <m:sub>
+                          <m:sSup>
+                            <m:sSupPr>
+                              <m:ctrlPr>
+                                <a:rPr lang="en-US" b="0" i="1" smtClean="0">
+                                  <a:latin typeface="Cambria Math" panose="02040503050406030204" pitchFamily="18" charset="0"/>
+                                </a:rPr>
+                              </m:ctrlPr>
+                            </m:sSupPr>
+                            <m:e>
+                              <m:r>
+                                <a:rPr lang="en-US" b="0" i="1" smtClean="0">
+                                  <a:latin typeface="Cambria Math" panose="02040503050406030204" pitchFamily="18" charset="0"/>
+                                </a:rPr>
+                                <m:t>𝑥</m:t>
+                              </m:r>
+                            </m:e>
+                            <m:sup>
+                              <m:r>
+                                <a:rPr lang="en-US" b="0" i="1" smtClean="0">
+                                  <a:latin typeface="Cambria Math" panose="02040503050406030204" pitchFamily="18" charset="0"/>
+                                </a:rPr>
+                                <m:t>2</m:t>
+                              </m:r>
+                            </m:sup>
+                          </m:sSup>
+                          <m:sSup>
+                            <m:sSupPr>
+                              <m:ctrlPr>
+                                <a:rPr lang="en-US" b="0" i="1" smtClean="0">
+                                  <a:latin typeface="Cambria Math" panose="02040503050406030204" pitchFamily="18" charset="0"/>
+                                </a:rPr>
+                              </m:ctrlPr>
+                            </m:sSupPr>
+                            <m:e>
+                              <m:r>
+                                <a:rPr lang="en-US" b="0" i="1" smtClean="0">
+                                  <a:latin typeface="Cambria Math" panose="02040503050406030204" pitchFamily="18" charset="0"/>
+                                </a:rPr>
+                                <m:t>𝑡</m:t>
+                              </m:r>
+                            </m:e>
+                            <m:sup>
+                              <m:r>
+                                <a:rPr lang="en-US" b="0" i="1" smtClean="0">
+                                  <a:latin typeface="Cambria Math" panose="02040503050406030204" pitchFamily="18" charset="0"/>
+                                </a:rPr>
+                                <m:t>2</m:t>
+                              </m:r>
+                            </m:sup>
+                          </m:sSup>
+                        </m:sub>
+                        <m:sup>
+                          <m:r>
+                            <a:rPr lang="en-US" i="1">
+                              <a:latin typeface="Cambria Math" panose="02040503050406030204" pitchFamily="18" charset="0"/>
+                            </a:rPr>
+                            <m:t>4</m:t>
+                          </m:r>
+                        </m:sup>
+                      </m:sSubSup>
+                      <m:r>
+                        <a:rPr lang="en-US" b="0" i="1" smtClean="0">
+                          <a:latin typeface="Cambria Math" panose="02040503050406030204" pitchFamily="18" charset="0"/>
+                        </a:rPr>
+                        <m:t>𝑢</m:t>
+                      </m:r>
+                      <m:r>
+                        <a:rPr lang="en-US" b="0" i="1" smtClean="0">
+                          <a:latin typeface="Cambria Math" panose="02040503050406030204" pitchFamily="18" charset="0"/>
+                        </a:rPr>
+                        <m:t>+</m:t>
+                      </m:r>
+                      <m:r>
+                        <a:rPr lang="en-US" b="0" i="1" smtClean="0">
+                          <a:latin typeface="Cambria Math" panose="02040503050406030204" pitchFamily="18" charset="0"/>
+                        </a:rPr>
+                        <m:t>𝐶</m:t>
+                      </m:r>
+                      <m:sSubSup>
+                        <m:sSubSupPr>
+                          <m:ctrlPr>
+                            <a:rPr lang="en-US" b="0" i="1" smtClean="0">
+                              <a:latin typeface="Cambria Math" panose="02040503050406030204" pitchFamily="18" charset="0"/>
+                            </a:rPr>
+                          </m:ctrlPr>
+                        </m:sSubSupPr>
+                        <m:e>
+                          <m:r>
+                            <a:rPr lang="en-US" b="0" i="1" smtClean="0">
+                              <a:latin typeface="Cambria Math" panose="02040503050406030204" pitchFamily="18" charset="0"/>
+                            </a:rPr>
+                            <m:t>𝜕</m:t>
+                          </m:r>
+                        </m:e>
+                        <m:sub>
+                          <m:r>
+                            <a:rPr lang="en-US" b="0" i="1" smtClean="0">
+                              <a:latin typeface="Cambria Math" panose="02040503050406030204" pitchFamily="18" charset="0"/>
+                            </a:rPr>
+                            <m:t>𝑥</m:t>
+                          </m:r>
+                        </m:sub>
+                        <m:sup>
+                          <m:r>
+                            <a:rPr lang="en-US" b="0" i="1" smtClean="0">
+                              <a:latin typeface="Cambria Math" panose="02040503050406030204" pitchFamily="18" charset="0"/>
+                            </a:rPr>
+                            <m:t>4</m:t>
+                          </m:r>
+                        </m:sup>
+                      </m:sSubSup>
+                      <m:r>
+                        <a:rPr lang="en-US" b="0" i="1" smtClean="0">
+                          <a:latin typeface="Cambria Math" panose="02040503050406030204" pitchFamily="18" charset="0"/>
+                        </a:rPr>
+                        <m:t>𝑢</m:t>
+                      </m:r>
+                      <m:r>
+                        <a:rPr lang="en-US" b="0" i="1" smtClean="0">
+                          <a:latin typeface="Cambria Math" panose="02040503050406030204" pitchFamily="18" charset="0"/>
+                        </a:rPr>
+                        <m:t>=</m:t>
+                      </m:r>
+                      <m:r>
+                        <a:rPr lang="en-US" b="0" i="1" smtClean="0">
+                          <a:latin typeface="Cambria Math" panose="02040503050406030204" pitchFamily="18" charset="0"/>
+                        </a:rPr>
+                        <m:t>𝑓</m:t>
+                      </m:r>
+                      <m:d>
+                        <m:dPr>
+                          <m:ctrlPr>
+                            <a:rPr lang="en-US" b="0" i="1" smtClean="0">
+                              <a:latin typeface="Cambria Math" panose="02040503050406030204" pitchFamily="18" charset="0"/>
+                            </a:rPr>
+                          </m:ctrlPr>
+                        </m:dPr>
+                        <m:e>
+                          <m:r>
+                            <a:rPr lang="en-US" b="0" i="1" smtClean="0">
+                              <a:latin typeface="Cambria Math" panose="02040503050406030204" pitchFamily="18" charset="0"/>
+                            </a:rPr>
+                            <m:t>𝑡</m:t>
+                          </m:r>
+                          <m:r>
+                            <a:rPr lang="en-US" b="0" i="1" smtClean="0">
+                              <a:latin typeface="Cambria Math" panose="02040503050406030204" pitchFamily="18" charset="0"/>
+                            </a:rPr>
+                            <m:t>,</m:t>
+                          </m:r>
+                          <m:r>
+                            <a:rPr lang="en-US" b="0" i="1" smtClean="0">
+                              <a:latin typeface="Cambria Math" panose="02040503050406030204" pitchFamily="18" charset="0"/>
+                            </a:rPr>
+                            <m:t>𝑥</m:t>
+                          </m:r>
+                        </m:e>
+                      </m:d>
+                      <m:r>
+                        <a:rPr lang="en-US" b="0" i="1" smtClean="0">
+                          <a:latin typeface="Cambria Math" panose="02040503050406030204" pitchFamily="18" charset="0"/>
+                        </a:rPr>
+                        <m:t>,</m:t>
+                      </m:r>
+                    </m:oMath>
+                  </m:oMathPara>
+                </a14:m>
+                <a:endParaRPr lang="en-US" dirty="0"/>
+              </a:p>
+              <a:p>
+                <a:r>
+                  <a:rPr lang="ru-RU" dirty="0"/>
+                  <a:t>где </a:t>
+                </a:r>
+                <a14:m>
+                  <m:oMath xmlns:m="http://schemas.openxmlformats.org/officeDocument/2006/math">
+                    <m:r>
+                      <a:rPr lang="en-US" b="0" i="1" smtClean="0">
+                        <a:latin typeface="Cambria Math" panose="02040503050406030204" pitchFamily="18" charset="0"/>
+                      </a:rPr>
+                      <m:t>𝐷</m:t>
+                    </m:r>
+                    <m:r>
+                      <a:rPr lang="en-US" b="0" i="1" smtClean="0">
+                        <a:latin typeface="Cambria Math" panose="02040503050406030204" pitchFamily="18" charset="0"/>
+                      </a:rPr>
+                      <m:t>=</m:t>
+                    </m:r>
+                    <m:sSup>
+                      <m:sSupPr>
+                        <m:ctrlPr>
+                          <a:rPr lang="en-US" b="0" i="1" smtClean="0">
+                            <a:latin typeface="Cambria Math" panose="02040503050406030204" pitchFamily="18" charset="0"/>
+                          </a:rPr>
+                        </m:ctrlPr>
+                      </m:sSupPr>
+                      <m:e>
+                        <m:r>
+                          <a:rPr lang="en-US" b="0" i="1" smtClean="0">
+                            <a:latin typeface="Cambria Math" panose="02040503050406030204" pitchFamily="18" charset="0"/>
+                          </a:rPr>
+                          <m:t>𝑅</m:t>
+                        </m:r>
+                      </m:e>
+                      <m:sup>
+                        <m:r>
+                          <a:rPr lang="en-US" b="0" i="1" smtClean="0">
+                            <a:latin typeface="Cambria Math" panose="02040503050406030204" pitchFamily="18" charset="0"/>
+                          </a:rPr>
+                          <m:t>2</m:t>
+                        </m:r>
+                      </m:sup>
+                    </m:sSup>
+                  </m:oMath>
+                </a14:m>
+                <a:r>
+                  <a:rPr lang="ru-RU" dirty="0"/>
+                  <a:t> и </a:t>
+                </a:r>
+                <a14:m>
+                  <m:oMath xmlns:m="http://schemas.openxmlformats.org/officeDocument/2006/math">
+                    <m:r>
+                      <a:rPr lang="en-US" b="0" i="1" smtClean="0">
+                        <a:latin typeface="Cambria Math" panose="02040503050406030204" pitchFamily="18" charset="0"/>
+                      </a:rPr>
+                      <m:t>𝐶</m:t>
+                    </m:r>
+                    <m:r>
+                      <a:rPr lang="en-US" b="0" i="1" smtClean="0">
+                        <a:latin typeface="Cambria Math" panose="02040503050406030204" pitchFamily="18" charset="0"/>
+                      </a:rPr>
+                      <m:t>=</m:t>
+                    </m:r>
+                    <m:r>
+                      <a:rPr lang="en-US" b="0" i="1" smtClean="0">
+                        <a:latin typeface="Cambria Math" panose="02040503050406030204" pitchFamily="18" charset="0"/>
+                      </a:rPr>
+                      <m:t>𝐸</m:t>
+                    </m:r>
+                    <m:sSup>
+                      <m:sSupPr>
+                        <m:ctrlPr>
+                          <a:rPr lang="en-US" b="0" i="1" smtClean="0">
+                            <a:latin typeface="Cambria Math" panose="02040503050406030204" pitchFamily="18" charset="0"/>
+                          </a:rPr>
+                        </m:ctrlPr>
+                      </m:sSupPr>
+                      <m:e>
+                        <m:r>
+                          <a:rPr lang="en-US" b="0" i="1" smtClean="0">
+                            <a:latin typeface="Cambria Math" panose="02040503050406030204" pitchFamily="18" charset="0"/>
+                          </a:rPr>
+                          <m:t>𝑅</m:t>
+                        </m:r>
+                      </m:e>
+                      <m:sup>
+                        <m:r>
+                          <a:rPr lang="en-US" b="0" i="1" smtClean="0">
+                            <a:latin typeface="Cambria Math" panose="02040503050406030204" pitchFamily="18" charset="0"/>
+                          </a:rPr>
+                          <m:t>2</m:t>
+                        </m:r>
+                      </m:sup>
+                    </m:sSup>
+                    <m:r>
+                      <a:rPr lang="en-US" b="0" i="1" smtClean="0">
+                        <a:latin typeface="Cambria Math" panose="02040503050406030204" pitchFamily="18" charset="0"/>
+                      </a:rPr>
+                      <m:t>/</m:t>
+                    </m:r>
+                    <m:r>
+                      <a:rPr lang="en-US" b="0" i="1" smtClean="0">
+                        <a:latin typeface="Cambria Math" panose="02040503050406030204" pitchFamily="18" charset="0"/>
+                      </a:rPr>
+                      <m:t>𝜌</m:t>
+                    </m:r>
+                  </m:oMath>
+                </a14:m>
+                <a:r>
+                  <a:rPr lang="ru-RU" dirty="0"/>
+                  <a:t>.</a:t>
+                </a:r>
+                <a:r>
+                  <a:rPr lang="en-US" dirty="0"/>
+                  <a:t> </a:t>
+                </a:r>
+                <a:r>
+                  <a:rPr lang="ru-RU" dirty="0"/>
+                  <a:t>Безразмерные параметры:</a:t>
+                </a:r>
+              </a:p>
+              <a:p>
+                <a:pPr/>
                 <a14:m>
                   <m:oMathPara xmlns:m="http://schemas.openxmlformats.org/officeDocument/2006/math">
                     <m:oMathParaPr>
@@ -16827,7 +16836,7 @@
             </p:txBody>
           </p:sp>
         </mc:Choice>
-        <mc:Fallback>
+        <mc:Fallback xmlns="">
           <p:sp>
             <p:nvSpPr>
               <p:cNvPr id="4" name="Текст 3">
@@ -16957,8 +16966,8 @@
           </a:p>
         </p:txBody>
       </p:sp>
-      <mc:AlternateContent xmlns:mc="http://schemas.openxmlformats.org/markup-compatibility/2006">
-        <mc:Choice xmlns:a14="http://schemas.microsoft.com/office/drawing/2010/main" Requires="a14">
+      <mc:AlternateContent xmlns:mc="http://schemas.openxmlformats.org/markup-compatibility/2006" xmlns:a14="http://schemas.microsoft.com/office/drawing/2010/main">
+        <mc:Choice Requires="a14">
           <p:graphicFrame>
             <p:nvGraphicFramePr>
               <p:cNvPr id="8" name="Table 8">
@@ -17340,7 +17349,7 @@
             </a:graphic>
           </p:graphicFrame>
         </mc:Choice>
-        <mc:Fallback>
+        <mc:Fallback xmlns="">
           <p:graphicFrame>
             <p:nvGraphicFramePr>
               <p:cNvPr id="8" name="Table 8">
@@ -17668,8 +17677,8 @@
           </a:prstGeom>
         </p:spPr>
       </p:pic>
-      <mc:AlternateContent xmlns:mc="http://schemas.openxmlformats.org/markup-compatibility/2006">
-        <mc:Choice xmlns:a14="http://schemas.microsoft.com/office/drawing/2010/main" Requires="a14">
+      <mc:AlternateContent xmlns:mc="http://schemas.openxmlformats.org/markup-compatibility/2006" xmlns:a14="http://schemas.microsoft.com/office/drawing/2010/main">
+        <mc:Choice Requires="a14">
           <p:graphicFrame>
             <p:nvGraphicFramePr>
               <p:cNvPr id="17" name="Table 17">
@@ -17736,6 +17745,7 @@
                         <a:bodyPr/>
                         <a:lstStyle/>
                         <a:p>
+                          <a:pPr/>
                           <a14:m>
                             <m:oMathPara xmlns:m="http://schemas.openxmlformats.org/officeDocument/2006/math">
                               <m:oMathParaPr>
@@ -17761,6 +17771,7 @@
                         <a:bodyPr/>
                         <a:lstStyle/>
                         <a:p>
+                          <a:pPr/>
                           <a14:m>
                             <m:oMathPara xmlns:m="http://schemas.openxmlformats.org/officeDocument/2006/math">
                               <m:oMathParaPr>
@@ -17833,6 +17844,7 @@
                         <a:bodyPr/>
                         <a:lstStyle/>
                         <a:p>
+                          <a:pPr/>
                           <a14:m>
                             <m:oMathPara xmlns:m="http://schemas.openxmlformats.org/officeDocument/2006/math">
                               <m:oMathParaPr>
@@ -17894,6 +17906,7 @@
                         <a:bodyPr/>
                         <a:lstStyle/>
                         <a:p>
+                          <a:pPr/>
                           <a14:m>
                             <m:oMathPara xmlns:m="http://schemas.openxmlformats.org/officeDocument/2006/math">
                               <m:oMathParaPr>
@@ -17919,6 +17932,7 @@
                         <a:bodyPr/>
                         <a:lstStyle/>
                         <a:p>
+                          <a:pPr/>
                           <a14:m>
                             <m:oMathPara xmlns:m="http://schemas.openxmlformats.org/officeDocument/2006/math">
                               <m:oMathParaPr>
@@ -17979,6 +17993,7 @@
                         <a:bodyPr/>
                         <a:lstStyle/>
                         <a:p>
+                          <a:pPr/>
                           <a14:m>
                             <m:oMathPara xmlns:m="http://schemas.openxmlformats.org/officeDocument/2006/math">
                               <m:oMathParaPr>
@@ -18040,6 +18055,7 @@
                         <a:bodyPr/>
                         <a:lstStyle/>
                         <a:p>
+                          <a:pPr/>
                           <a14:m>
                             <m:oMathPara xmlns:m="http://schemas.openxmlformats.org/officeDocument/2006/math">
                               <m:oMathParaPr>
@@ -18065,6 +18081,7 @@
                         <a:bodyPr/>
                         <a:lstStyle/>
                         <a:p>
+                          <a:pPr/>
                           <a14:m>
                             <m:oMathPara xmlns:m="http://schemas.openxmlformats.org/officeDocument/2006/math">
                               <m:oMathParaPr>
@@ -18108,6 +18125,7 @@
                         <a:bodyPr/>
                         <a:lstStyle/>
                         <a:p>
+                          <a:pPr/>
                           <a14:m>
                             <m:oMathPara xmlns:m="http://schemas.openxmlformats.org/officeDocument/2006/math">
                               <m:oMathParaPr>
@@ -18169,6 +18187,7 @@
                         <a:bodyPr/>
                         <a:lstStyle/>
                         <a:p>
+                          <a:pPr/>
                           <a14:m>
                             <m:oMathPara xmlns:m="http://schemas.openxmlformats.org/officeDocument/2006/math">
                               <m:oMathParaPr>
@@ -18266,6 +18285,7 @@
                         <a:bodyPr/>
                         <a:lstStyle/>
                         <a:p>
+                          <a:pPr/>
                           <a14:m>
                             <m:oMathPara xmlns:m="http://schemas.openxmlformats.org/officeDocument/2006/math">
                               <m:oMathParaPr>
@@ -18291,6 +18311,7 @@
                         <a:bodyPr/>
                         <a:lstStyle/>
                         <a:p>
+                          <a:pPr/>
                           <a14:m>
                             <m:oMathPara xmlns:m="http://schemas.openxmlformats.org/officeDocument/2006/math">
                               <m:oMathParaPr>
@@ -18390,6 +18411,7 @@
                         <a:bodyPr/>
                         <a:lstStyle/>
                         <a:p>
+                          <a:pPr/>
                           <a14:m>
                             <m:oMathPara xmlns:m="http://schemas.openxmlformats.org/officeDocument/2006/math">
                               <m:oMathParaPr>
@@ -18415,6 +18437,7 @@
                         <a:bodyPr/>
                         <a:lstStyle/>
                         <a:p>
+                          <a:pPr/>
                           <a14:m>
                             <m:oMathPara xmlns:m="http://schemas.openxmlformats.org/officeDocument/2006/math">
                               <m:oMathParaPr>
@@ -18503,6 +18526,7 @@
                         <a:bodyPr/>
                         <a:lstStyle/>
                         <a:p>
+                          <a:pPr/>
                           <a14:m>
                             <m:oMathPara xmlns:m="http://schemas.openxmlformats.org/officeDocument/2006/math">
                               <m:oMathParaPr>
@@ -18565,7 +18589,7 @@
             </a:graphic>
           </p:graphicFrame>
         </mc:Choice>
-        <mc:Fallback>
+        <mc:Fallback xmlns="">
           <p:graphicFrame>
             <p:nvGraphicFramePr>
               <p:cNvPr id="17" name="Table 17">
@@ -19818,9 +19842,10 @@
                   <a:t> </a:t>
                 </a:r>
                 <a:r>
-                  <a:rPr lang="ru-RU" dirty="0"/>
-                  <a:t>Безразмерные параметры</a:t>
+                  <a:rPr lang="ru-RU"/>
+                  <a:t>Безразмерные параметры:</a:t>
                 </a:r>
+                <a:endParaRPr lang="ru-RU" dirty="0"/>
               </a:p>
               <a:p>
                 <a:pPr/>
@@ -20104,8 +20129,8 @@
           </a:p>
         </p:txBody>
       </p:sp>
-      <mc:AlternateContent xmlns:mc="http://schemas.openxmlformats.org/markup-compatibility/2006">
-        <mc:Choice xmlns:a14="http://schemas.microsoft.com/office/drawing/2010/main" Requires="a14">
+      <mc:AlternateContent xmlns:mc="http://schemas.openxmlformats.org/markup-compatibility/2006" xmlns:a14="http://schemas.microsoft.com/office/drawing/2010/main">
+        <mc:Choice Requires="a14">
           <p:graphicFrame>
             <p:nvGraphicFramePr>
               <p:cNvPr id="8" name="Table 8">
@@ -20487,7 +20512,7 @@
             </a:graphic>
           </p:graphicFrame>
         </mc:Choice>
-        <mc:Fallback>
+        <mc:Fallback xmlns="">
           <p:graphicFrame>
             <p:nvGraphicFramePr>
               <p:cNvPr id="8" name="Table 8">
@@ -20755,8 +20780,8 @@
           </p:graphicFrame>
         </mc:Fallback>
       </mc:AlternateContent>
-      <mc:AlternateContent xmlns:mc="http://schemas.openxmlformats.org/markup-compatibility/2006">
-        <mc:Choice xmlns:a14="http://schemas.microsoft.com/office/drawing/2010/main" Requires="a14">
+      <mc:AlternateContent xmlns:mc="http://schemas.openxmlformats.org/markup-compatibility/2006" xmlns:a14="http://schemas.microsoft.com/office/drawing/2010/main">
+        <mc:Choice Requires="a14">
           <p:graphicFrame>
             <p:nvGraphicFramePr>
               <p:cNvPr id="17" name="Table 17">
@@ -20875,13 +20900,7 @@
                                       <a:rPr lang="ru-RU" sz="1200" b="0" i="1" smtClean="0">
                                         <a:latin typeface="Cambria Math" panose="02040503050406030204" pitchFamily="18" charset="0"/>
                                       </a:rPr>
-                                      <m:t>7−</m:t>
-                                    </m:r>
-                                    <m:r>
-                                      <a:rPr lang="ru-RU" sz="1200" b="0" i="1" smtClean="0">
-                                        <a:latin typeface="Cambria Math" panose="02040503050406030204" pitchFamily="18" charset="0"/>
-                                      </a:rPr>
-                                      <m:t>15</m:t>
+                                      <m:t>7−15</m:t>
                                     </m:r>
                                     <m:r>
                                       <a:rPr lang="en-US" sz="1200" b="0" i="1" smtClean="0">
@@ -20973,6 +20992,7 @@
                         <a:bodyPr/>
                         <a:lstStyle/>
                         <a:p>
+                          <a:pPr/>
                           <a14:m>
                             <m:oMathPara xmlns:m="http://schemas.openxmlformats.org/officeDocument/2006/math">
                               <m:oMathParaPr>
@@ -21112,13 +21132,7 @@
                                       <a:rPr lang="en-US" sz="1200" b="0" i="1" smtClean="0">
                                         <a:latin typeface="Cambria Math" panose="02040503050406030204" pitchFamily="18" charset="0"/>
                                       </a:rPr>
-                                      <m:t>+</m:t>
-                                    </m:r>
-                                    <m:r>
-                                      <a:rPr lang="en-US" sz="1200" b="0" i="1" smtClean="0">
-                                        <a:latin typeface="Cambria Math" panose="02040503050406030204" pitchFamily="18" charset="0"/>
-                                      </a:rPr>
-                                      <m:t>90</m:t>
+                                      <m:t>+90</m:t>
                                     </m:r>
                                     <m:r>
                                       <a:rPr lang="en-US" sz="1200" b="0" i="1" smtClean="0">
@@ -21198,6 +21212,7 @@
                         <a:bodyPr/>
                         <a:lstStyle/>
                         <a:p>
+                          <a:pPr/>
                           <a14:m>
                             <m:oMathPara xmlns:m="http://schemas.openxmlformats.org/officeDocument/2006/math">
                               <m:oMathParaPr>
@@ -21423,6 +21438,7 @@
                         <a:bodyPr/>
                         <a:lstStyle/>
                         <a:p>
+                          <a:pPr/>
                           <a14:m>
                             <m:oMathPara xmlns:m="http://schemas.openxmlformats.org/officeDocument/2006/math">
                               <m:oMathParaPr>
@@ -21518,6 +21534,7 @@
                         <a:bodyPr/>
                         <a:lstStyle/>
                         <a:p>
+                          <a:pPr/>
                           <a14:m>
                             <m:oMathPara xmlns:m="http://schemas.openxmlformats.org/officeDocument/2006/math">
                               <m:oMathParaPr>
@@ -21647,6 +21664,7 @@
                         <a:bodyPr/>
                         <a:lstStyle/>
                         <a:p>
+                          <a:pPr/>
                           <a14:m>
                             <m:oMathPara xmlns:m="http://schemas.openxmlformats.org/officeDocument/2006/math">
                               <m:oMathParaPr>
@@ -21854,6 +21872,7 @@
                         <a:bodyPr/>
                         <a:lstStyle/>
                         <a:p>
+                          <a:pPr/>
                           <a14:m>
                             <m:oMathPara xmlns:m="http://schemas.openxmlformats.org/officeDocument/2006/math">
                               <m:oMathParaPr>
@@ -21987,13 +22006,7 @@
                                       <a:rPr lang="en-US" sz="1200" b="0" i="1" smtClean="0">
                                         <a:latin typeface="Cambria Math" panose="02040503050406030204" pitchFamily="18" charset="0"/>
                                       </a:rPr>
-                                      <m:t>+9</m:t>
-                                    </m:r>
-                                    <m:r>
-                                      <a:rPr lang="ru-RU" sz="1200" b="0" i="1" smtClean="0">
-                                        <a:latin typeface="Cambria Math" panose="02040503050406030204" pitchFamily="18" charset="0"/>
-                                      </a:rPr>
-                                      <m:t>0</m:t>
+                                      <m:t>+90</m:t>
                                     </m:r>
                                     <m:r>
                                       <a:rPr lang="en-US" sz="1200" b="0" i="1" smtClean="0">
@@ -22130,7 +22143,7 @@
             </a:graphic>
           </p:graphicFrame>
         </mc:Choice>
-        <mc:Fallback>
+        <mc:Fallback xmlns="">
           <p:graphicFrame>
             <p:nvGraphicFramePr>
               <p:cNvPr id="17" name="Table 17">
@@ -22707,8 +22720,8 @@
           </a:prstGeom>
         </p:spPr>
       </p:pic>
-      <mc:AlternateContent xmlns:mc="http://schemas.openxmlformats.org/markup-compatibility/2006">
-        <mc:Choice xmlns:a14="http://schemas.microsoft.com/office/drawing/2010/main" Requires="a14">
+      <mc:AlternateContent xmlns:mc="http://schemas.openxmlformats.org/markup-compatibility/2006" xmlns:a14="http://schemas.microsoft.com/office/drawing/2010/main">
+        <mc:Choice Requires="a14">
           <p:sp>
             <p:nvSpPr>
               <p:cNvPr id="15" name="TextBox 14">
@@ -22901,7 +22914,7 @@
             </p:txBody>
           </p:sp>
         </mc:Choice>
-        <mc:Fallback>
+        <mc:Fallback xmlns="">
           <p:sp>
             <p:nvSpPr>
               <p:cNvPr id="15" name="TextBox 14">
@@ -23004,8 +23017,8 @@
           </a:p>
         </p:txBody>
       </p:sp>
-      <mc:AlternateContent xmlns:mc="http://schemas.openxmlformats.org/markup-compatibility/2006">
-        <mc:Choice xmlns:a14="http://schemas.microsoft.com/office/drawing/2010/main" Requires="a14">
+      <mc:AlternateContent xmlns:mc="http://schemas.openxmlformats.org/markup-compatibility/2006" xmlns:a14="http://schemas.microsoft.com/office/drawing/2010/main">
+        <mc:Choice Requires="a14">
           <p:sp>
             <p:nvSpPr>
               <p:cNvPr id="4" name="Текст 3">
@@ -23872,7 +23885,7 @@
             </p:txBody>
           </p:sp>
         </mc:Choice>
-        <mc:Fallback>
+        <mc:Fallback xmlns="">
           <p:sp>
             <p:nvSpPr>
               <p:cNvPr id="4" name="Текст 3">
@@ -24002,8 +24015,8 @@
           </a:p>
         </p:txBody>
       </p:sp>
-      <mc:AlternateContent xmlns:mc="http://schemas.openxmlformats.org/markup-compatibility/2006">
-        <mc:Choice xmlns:a14="http://schemas.microsoft.com/office/drawing/2010/main" Requires="a14">
+      <mc:AlternateContent xmlns:mc="http://schemas.openxmlformats.org/markup-compatibility/2006" xmlns:a14="http://schemas.microsoft.com/office/drawing/2010/main">
+        <mc:Choice Requires="a14">
           <p:sp>
             <p:nvSpPr>
               <p:cNvPr id="8" name="TextBox 7">
@@ -24561,7 +24574,7 @@
             </p:txBody>
           </p:sp>
         </mc:Choice>
-        <mc:Fallback>
+        <mc:Fallback xmlns="">
           <p:sp>
             <p:nvSpPr>
               <p:cNvPr id="8" name="TextBox 7">
@@ -24606,8 +24619,8 @@
           </p:sp>
         </mc:Fallback>
       </mc:AlternateContent>
-      <mc:AlternateContent xmlns:mc="http://schemas.openxmlformats.org/markup-compatibility/2006">
-        <mc:Choice xmlns:a14="http://schemas.microsoft.com/office/drawing/2010/main" Requires="a14">
+      <mc:AlternateContent xmlns:mc="http://schemas.openxmlformats.org/markup-compatibility/2006" xmlns:a14="http://schemas.microsoft.com/office/drawing/2010/main">
+        <mc:Choice Requires="a14">
           <p:graphicFrame>
             <p:nvGraphicFramePr>
               <p:cNvPr id="11" name="Table 8">
@@ -24799,6 +24812,7 @@
                         <a:bodyPr/>
                         <a:lstStyle/>
                         <a:p>
+                          <a:pPr/>
                           <a14:m>
                             <m:oMathPara xmlns:m="http://schemas.openxmlformats.org/officeDocument/2006/math">
                               <m:oMathParaPr>
@@ -24883,6 +24897,7 @@
                         <a:bodyPr/>
                         <a:lstStyle/>
                         <a:p>
+                          <a:pPr/>
                           <a14:m>
                             <m:oMathPara xmlns:m="http://schemas.openxmlformats.org/officeDocument/2006/math">
                               <m:oMathParaPr>
@@ -25116,6 +25131,7 @@
                         <a:bodyPr/>
                         <a:lstStyle/>
                         <a:p>
+                          <a:pPr/>
                           <a14:m>
                             <m:oMathPara xmlns:m="http://schemas.openxmlformats.org/officeDocument/2006/math">
                               <m:oMathParaPr>
@@ -25141,6 +25157,7 @@
                         <a:bodyPr/>
                         <a:lstStyle/>
                         <a:p>
+                          <a:pPr/>
                           <a14:m>
                             <m:oMathPara xmlns:m="http://schemas.openxmlformats.org/officeDocument/2006/math">
                               <m:oMathParaPr>
@@ -25205,6 +25222,7 @@
                         <a:bodyPr/>
                         <a:lstStyle/>
                         <a:p>
+                          <a:pPr/>
                           <a14:m>
                             <m:oMathPara xmlns:m="http://schemas.openxmlformats.org/officeDocument/2006/math">
                               <m:oMathParaPr>
@@ -25230,6 +25248,7 @@
                         <a:bodyPr/>
                         <a:lstStyle/>
                         <a:p>
+                          <a:pPr/>
                           <a14:m>
                             <m:oMathPara xmlns:m="http://schemas.openxmlformats.org/officeDocument/2006/math">
                               <m:oMathParaPr>
@@ -25261,7 +25280,7 @@
             </a:graphic>
           </p:graphicFrame>
         </mc:Choice>
-        <mc:Fallback>
+        <mc:Fallback xmlns="">
           <p:graphicFrame>
             <p:nvGraphicFramePr>
               <p:cNvPr id="11" name="Table 8">
@@ -25660,8 +25679,8 @@
           </p:graphicFrame>
         </mc:Fallback>
       </mc:AlternateContent>
-      <mc:AlternateContent xmlns:mc="http://schemas.openxmlformats.org/markup-compatibility/2006">
-        <mc:Choice xmlns:a14="http://schemas.microsoft.com/office/drawing/2010/main" Requires="a14">
+      <mc:AlternateContent xmlns:mc="http://schemas.openxmlformats.org/markup-compatibility/2006" xmlns:a14="http://schemas.microsoft.com/office/drawing/2010/main">
+        <mc:Choice Requires="a14">
           <p:sp>
             <p:nvSpPr>
               <p:cNvPr id="12" name="TextBox 11">
@@ -25859,7 +25878,7 @@
             </p:txBody>
           </p:sp>
         </mc:Choice>
-        <mc:Fallback>
+        <mc:Fallback xmlns="">
           <p:sp>
             <p:nvSpPr>
               <p:cNvPr id="12" name="TextBox 11">
@@ -26524,21 +26543,6 @@
 </file>
 
 <file path=customXml/item1.xml><?xml version="1.0" encoding="utf-8"?>
-<p:properties xmlns:p="http://schemas.microsoft.com/office/2006/metadata/properties" xmlns:xsi="http://www.w3.org/2001/XMLSchema-instance" xmlns:pc="http://schemas.microsoft.com/office/infopath/2007/PartnerControls">
-  <documentManagement/>
-</p:properties>
-</file>
-
-<file path=customXml/item2.xml><?xml version="1.0" encoding="utf-8"?>
-<?mso-contentType ?>
-<FormTemplates xmlns="http://schemas.microsoft.com/sharepoint/v3/contenttype/forms">
-  <Display>DocumentLibraryForm</Display>
-  <Edit>DocumentLibraryForm</Edit>
-  <New>DocumentLibraryForm</New>
-</FormTemplates>
-</file>
-
-<file path=customXml/item3.xml><?xml version="1.0" encoding="utf-8"?>
 <ct:contentTypeSchema xmlns:ct="http://schemas.microsoft.com/office/2006/metadata/contentType" xmlns:ma="http://schemas.microsoft.com/office/2006/metadata/properties/metaAttributes" ct:_="" ma:_="" ma:contentTypeName="Документ" ma:contentTypeID="0x0101002A9C74E6E830D74E9B0FDDB4017A5417" ma:contentTypeVersion="13" ma:contentTypeDescription="Создание документа." ma:contentTypeScope="" ma:versionID="d4e423622451d608a8a05f4da7a1e1a2">
   <xsd:schema xmlns:xsd="http://www.w3.org/2001/XMLSchema" xmlns:xs="http://www.w3.org/2001/XMLSchema" xmlns:p="http://schemas.microsoft.com/office/2006/metadata/properties" xmlns:ns2="9875bd71-cde8-496c-a136-433f55d5e6d0" xmlns:ns3="e96afe77-3acb-4328-97fc-408e1bde3ecd" targetNamespace="http://schemas.microsoft.com/office/2006/metadata/properties" ma:root="true" ma:fieldsID="4831203c63c08b9f52ea6d3ee0d7a96e" ns2:_="" ns3:_="">
     <xsd:import namespace="9875bd71-cde8-496c-a136-433f55d5e6d0"/>
@@ -26761,32 +26765,22 @@
 </ct:contentTypeSchema>
 </file>
 
-<file path=customXml/itemProps1.xml><?xml version="1.0" encoding="utf-8"?>
-<ds:datastoreItem xmlns:ds="http://schemas.openxmlformats.org/officeDocument/2006/customXml" ds:itemID="{433DAF31-D8A6-49A0-9A5D-8B2EA5B1C511}">
-  <ds:schemaRefs>
-    <ds:schemaRef ds:uri="http://purl.org/dc/elements/1.1/"/>
-    <ds:schemaRef ds:uri="http://schemas.microsoft.com/office/2006/documentManagement/types"/>
-    <ds:schemaRef ds:uri="http://schemas.microsoft.com/office/infopath/2007/PartnerControls"/>
-    <ds:schemaRef ds:uri="http://purl.org/dc/dcmitype/"/>
-    <ds:schemaRef ds:uri="e96afe77-3acb-4328-97fc-408e1bde3ecd"/>
-    <ds:schemaRef ds:uri="http://schemas.microsoft.com/office/2006/metadata/properties"/>
-    <ds:schemaRef ds:uri="http://purl.org/dc/terms/"/>
-    <ds:schemaRef ds:uri="http://www.w3.org/XML/1998/namespace"/>
-    <ds:schemaRef ds:uri="http://schemas.openxmlformats.org/package/2006/metadata/core-properties"/>
-    <ds:schemaRef ds:uri="9875bd71-cde8-496c-a136-433f55d5e6d0"/>
-  </ds:schemaRefs>
-</ds:datastoreItem>
+<file path=customXml/item2.xml><?xml version="1.0" encoding="utf-8"?>
+<?mso-contentType ?>
+<FormTemplates xmlns="http://schemas.microsoft.com/sharepoint/v3/contenttype/forms">
+  <Display>DocumentLibraryForm</Display>
+  <Edit>DocumentLibraryForm</Edit>
+  <New>DocumentLibraryForm</New>
+</FormTemplates>
 </file>
 
-<file path=customXml/itemProps2.xml><?xml version="1.0" encoding="utf-8"?>
-<ds:datastoreItem xmlns:ds="http://schemas.openxmlformats.org/officeDocument/2006/customXml" ds:itemID="{B34386AA-1848-4C75-B336-1053927CB025}">
-  <ds:schemaRefs>
-    <ds:schemaRef ds:uri="http://schemas.microsoft.com/sharepoint/v3/contenttype/forms"/>
-  </ds:schemaRefs>
-</ds:datastoreItem>
+<file path=customXml/item3.xml><?xml version="1.0" encoding="utf-8"?>
+<p:properties xmlns:p="http://schemas.microsoft.com/office/2006/metadata/properties" xmlns:xsi="http://www.w3.org/2001/XMLSchema-instance" xmlns:pc="http://schemas.microsoft.com/office/infopath/2007/PartnerControls">
+  <documentManagement/>
+</p:properties>
 </file>
 
-<file path=customXml/itemProps3.xml><?xml version="1.0" encoding="utf-8"?>
+<file path=customXml/itemProps1.xml><?xml version="1.0" encoding="utf-8"?>
 <ds:datastoreItem xmlns:ds="http://schemas.openxmlformats.org/officeDocument/2006/customXml" ds:itemID="{4D4651DD-DCCC-4759-B2F6-7F520BDCC2B9}">
   <ds:schemaRefs>
     <ds:schemaRef ds:uri="http://schemas.microsoft.com/office/2006/metadata/contentType"/>
@@ -26803,4 +26797,29 @@
     <ds:schemaRef ds:uri="http://schemas.microsoft.com/internal/obd"/>
   </ds:schemaRefs>
 </ds:datastoreItem>
+</file>
+
+<file path=customXml/itemProps2.xml><?xml version="1.0" encoding="utf-8"?>
+<ds:datastoreItem xmlns:ds="http://schemas.openxmlformats.org/officeDocument/2006/customXml" ds:itemID="{B34386AA-1848-4C75-B336-1053927CB025}">
+  <ds:schemaRefs>
+    <ds:schemaRef ds:uri="http://schemas.microsoft.com/sharepoint/v3/contenttype/forms"/>
+  </ds:schemaRefs>
+</ds:datastoreItem>
+</file>
+
+<file path=customXml/itemProps3.xml><?xml version="1.0" encoding="utf-8"?>
+<ds:datastoreItem xmlns:ds="http://schemas.openxmlformats.org/officeDocument/2006/customXml" ds:itemID="{433DAF31-D8A6-49A0-9A5D-8B2EA5B1C511}">
+  <ds:schemaRefs>
+    <ds:schemaRef ds:uri="http://purl.org/dc/elements/1.1/"/>
+    <ds:schemaRef ds:uri="http://schemas.microsoft.com/office/2006/documentManagement/types"/>
+    <ds:schemaRef ds:uri="http://schemas.microsoft.com/office/infopath/2007/PartnerControls"/>
+    <ds:schemaRef ds:uri="http://purl.org/dc/dcmitype/"/>
+    <ds:schemaRef ds:uri="e96afe77-3acb-4328-97fc-408e1bde3ecd"/>
+    <ds:schemaRef ds:uri="http://schemas.microsoft.com/office/2006/metadata/properties"/>
+    <ds:schemaRef ds:uri="http://purl.org/dc/terms/"/>
+    <ds:schemaRef ds:uri="http://www.w3.org/XML/1998/namespace"/>
+    <ds:schemaRef ds:uri="http://schemas.openxmlformats.org/package/2006/metadata/core-properties"/>
+    <ds:schemaRef ds:uri="9875bd71-cde8-496c-a136-433f55d5e6d0"/>
+  </ds:schemaRefs>
+</ds:datastoreItem>
 </file>
</xml_diff>